<commit_message>
Simplifying some topics on the slides
</commit_message>
<xml_diff>
--- a/ClassMaterials/OddsAndEnds/06-OddsAndEnds.pptx
+++ b/ClassMaterials/OddsAndEnds/06-OddsAndEnds.pptx
@@ -168,7 +168,7 @@
 <file path=ppt/revisionInfo.xml><?xml version="1.0" encoding="utf-8"?>
 <p1510:revInfo xmlns:a="http://schemas.openxmlformats.org/drawingml/2006/main" xmlns:r="http://schemas.openxmlformats.org/officeDocument/2006/relationships" xmlns:p1510="http://schemas.microsoft.com/office/powerpoint/2015/10/main">
   <p1510:revLst>
-    <p1510:client id="{37C8A5DD-6230-4952-8DEE-7C479736230B}" v="104" dt="2021-09-10T14:17:44.594"/>
+    <p1510:client id="{37C8A5DD-6230-4952-8DEE-7C479736230B}" v="107" dt="2021-09-10T17:20:26.485"/>
   </p1510:revLst>
 </p1510:revInfo>
 </file>
@@ -178,16 +178,46 @@
   <pc:docChgLst>
     <pc:chgData name="Hewner, Mike" userId="7f3f83dd-6dfb-4127-a87f-c1714bd4fac9" providerId="ADAL" clId="{37C8A5DD-6230-4952-8DEE-7C479736230B}"/>
     <pc:docChg chg="undo custSel addSld delSld modSld">
-      <pc:chgData name="Hewner, Mike" userId="7f3f83dd-6dfb-4127-a87f-c1714bd4fac9" providerId="ADAL" clId="{37C8A5DD-6230-4952-8DEE-7C479736230B}" dt="2021-09-10T14:17:44.594" v="362" actId="20577"/>
+      <pc:chgData name="Hewner, Mike" userId="7f3f83dd-6dfb-4127-a87f-c1714bd4fac9" providerId="ADAL" clId="{37C8A5DD-6230-4952-8DEE-7C479736230B}" dt="2021-09-10T17:20:26.485" v="463" actId="20577"/>
       <pc:docMkLst>
         <pc:docMk/>
       </pc:docMkLst>
+      <pc:sldChg chg="modSp mod">
+        <pc:chgData name="Hewner, Mike" userId="7f3f83dd-6dfb-4127-a87f-c1714bd4fac9" providerId="ADAL" clId="{37C8A5DD-6230-4952-8DEE-7C479736230B}" dt="2021-09-10T14:58:51.138" v="363" actId="20577"/>
+        <pc:sldMkLst>
+          <pc:docMk/>
+          <pc:sldMk cId="0" sldId="257"/>
+        </pc:sldMkLst>
+        <pc:spChg chg="mod">
+          <ac:chgData name="Hewner, Mike" userId="7f3f83dd-6dfb-4127-a87f-c1714bd4fac9" providerId="ADAL" clId="{37C8A5DD-6230-4952-8DEE-7C479736230B}" dt="2021-09-10T14:58:51.138" v="363" actId="20577"/>
+          <ac:spMkLst>
+            <pc:docMk/>
+            <pc:sldMk cId="0" sldId="257"/>
+            <ac:spMk id="363523" creationId="{00000000-0000-0000-0000-000000000000}"/>
+          </ac:spMkLst>
+        </pc:spChg>
+      </pc:sldChg>
       <pc:sldChg chg="del">
         <pc:chgData name="Hewner, Mike" userId="7f3f83dd-6dfb-4127-a87f-c1714bd4fac9" providerId="ADAL" clId="{37C8A5DD-6230-4952-8DEE-7C479736230B}" dt="2021-09-10T13:22:28.140" v="0" actId="47"/>
         <pc:sldMkLst>
           <pc:docMk/>
           <pc:sldMk cId="3003789725" sldId="310"/>
         </pc:sldMkLst>
+      </pc:sldChg>
+      <pc:sldChg chg="modSp mod modAnim modNotesTx">
+        <pc:chgData name="Hewner, Mike" userId="7f3f83dd-6dfb-4127-a87f-c1714bd4fac9" providerId="ADAL" clId="{37C8A5DD-6230-4952-8DEE-7C479736230B}" dt="2021-09-10T17:20:26.485" v="463" actId="20577"/>
+        <pc:sldMkLst>
+          <pc:docMk/>
+          <pc:sldMk cId="3615081806" sldId="315"/>
+        </pc:sldMkLst>
+        <pc:spChg chg="mod">
+          <ac:chgData name="Hewner, Mike" userId="7f3f83dd-6dfb-4127-a87f-c1714bd4fac9" providerId="ADAL" clId="{37C8A5DD-6230-4952-8DEE-7C479736230B}" dt="2021-09-10T17:20:26.485" v="463" actId="20577"/>
+          <ac:spMkLst>
+            <pc:docMk/>
+            <pc:sldMk cId="3615081806" sldId="315"/>
+            <ac:spMk id="3" creationId="{00000000-0000-0000-0000-000000000000}"/>
+          </ac:spMkLst>
+        </pc:spChg>
       </pc:sldChg>
       <pc:sldChg chg="delSp modSp mod delAnim">
         <pc:chgData name="Hewner, Mike" userId="7f3f83dd-6dfb-4127-a87f-c1714bd4fac9" providerId="ADAL" clId="{37C8A5DD-6230-4952-8DEE-7C479736230B}" dt="2021-09-10T14:17:44.594" v="362" actId="20577"/>
@@ -1166,6 +1196,127 @@
           <a:bodyPr/>
           <a:lstStyle/>
           <a:p>
+            <a:pPr marL="0" indent="0">
+              <a:spcBef>
+                <a:spcPts val="1028"/>
+              </a:spcBef>
+              <a:buNone/>
+            </a:pPr>
+            <a:r>
+              <a:rPr lang="en-US" dirty="0"/>
+              <a:t>We used to talk about </a:t>
+            </a:r>
+            <a:r>
+              <a:rPr lang="en-US" sz="1400" b="1" dirty="0">
+                <a:solidFill>
+                  <a:srgbClr val="FFFF00"/>
+                </a:solidFill>
+                <a:effectLst/>
+                <a:latin typeface="Calibri" panose="020F0502020204030204" pitchFamily="34" charset="0"/>
+                <a:cs typeface="Calibri" panose="020F0502020204030204" pitchFamily="34" charset="0"/>
+              </a:rPr>
+              <a:t>quasi-quote, unquote here</a:t>
+            </a:r>
+          </a:p>
+          <a:p>
+            <a:pPr marL="0" indent="0">
+              <a:spcBef>
+                <a:spcPts val="1028"/>
+              </a:spcBef>
+              <a:buNone/>
+            </a:pPr>
+            <a:endParaRPr lang="en-US" sz="1400" b="1" dirty="0">
+              <a:solidFill>
+                <a:srgbClr val="FFFF00"/>
+              </a:solidFill>
+              <a:effectLst/>
+              <a:latin typeface="Calibri" panose="020F0502020204030204" pitchFamily="34" charset="0"/>
+              <a:cs typeface="Calibri" panose="020F0502020204030204" pitchFamily="34" charset="0"/>
+            </a:endParaRPr>
+          </a:p>
+          <a:p>
+            <a:pPr marL="0" indent="0">
+              <a:spcBef>
+                <a:spcPts val="1028"/>
+              </a:spcBef>
+              <a:buNone/>
+            </a:pPr>
+            <a:r>
+              <a:rPr lang="en-US" sz="1400" b="0" dirty="0">
+                <a:solidFill>
+                  <a:srgbClr val="FFFF00"/>
+                </a:solidFill>
+                <a:effectLst/>
+                <a:latin typeface="Calibri" panose="020F0502020204030204" pitchFamily="34" charset="0"/>
+                <a:cs typeface="Calibri" panose="020F0502020204030204" pitchFamily="34" charset="0"/>
+              </a:rPr>
+              <a:t>I think it’s probably just a distraction</a:t>
+            </a:r>
+          </a:p>
+          <a:p>
+            <a:pPr marL="0" indent="0">
+              <a:spcBef>
+                <a:spcPts val="1028"/>
+              </a:spcBef>
+              <a:buNone/>
+            </a:pPr>
+            <a:endParaRPr lang="en-US" sz="1400" b="0" dirty="0">
+              <a:solidFill>
+                <a:srgbClr val="FFFF00"/>
+              </a:solidFill>
+              <a:effectLst/>
+              <a:latin typeface="Calibri" panose="020F0502020204030204" pitchFamily="34" charset="0"/>
+              <a:cs typeface="Calibri" panose="020F0502020204030204" pitchFamily="34" charset="0"/>
+            </a:endParaRPr>
+          </a:p>
+          <a:p>
+            <a:pPr marL="0" indent="0">
+              <a:spcBef>
+                <a:spcPts val="1028"/>
+              </a:spcBef>
+              <a:buNone/>
+            </a:pPr>
+            <a:r>
+              <a:rPr lang="en-US" sz="1400" dirty="0">
+                <a:effectLst/>
+                <a:latin typeface="Courier New" panose="02070309020205020404" pitchFamily="49" charset="0"/>
+                <a:cs typeface="Courier New" panose="02070309020205020404" pitchFamily="49" charset="0"/>
+              </a:rPr>
+              <a:t>(apply-many '(- cube (lambda (x) (/ x 2))) 3)</a:t>
+            </a:r>
+          </a:p>
+          <a:p>
+            <a:pPr marL="0" indent="0">
+              <a:spcBef>
+                <a:spcPts val="1028"/>
+              </a:spcBef>
+              <a:buNone/>
+            </a:pPr>
+            <a:r>
+              <a:rPr lang="en-US" sz="1400" dirty="0">
+                <a:effectLst/>
+                <a:latin typeface="Courier New" panose="02070309020205020404" pitchFamily="49" charset="0"/>
+                <a:cs typeface="Courier New" panose="02070309020205020404" pitchFamily="49" charset="0"/>
+              </a:rPr>
+              <a:t>  (apply-many `(,- ,cube ,(lambda (x) (/ x 2))) 3)</a:t>
+            </a:r>
+            <a:br>
+              <a:rPr lang="en-US" sz="1400" dirty="0">
+                <a:effectLst/>
+                <a:latin typeface="Courier New" panose="02070309020205020404" pitchFamily="49" charset="0"/>
+                <a:cs typeface="Courier New" panose="02070309020205020404" pitchFamily="49" charset="0"/>
+              </a:rPr>
+            </a:br>
+            <a:endParaRPr lang="en-US" sz="1400" b="0" dirty="0">
+              <a:solidFill>
+                <a:srgbClr val="FFFF00"/>
+              </a:solidFill>
+              <a:effectLst/>
+              <a:latin typeface="Calibri" panose="020F0502020204030204" pitchFamily="34" charset="0"/>
+              <a:cs typeface="Calibri" panose="020F0502020204030204" pitchFamily="34" charset="0"/>
+            </a:endParaRPr>
+          </a:p>
+          <a:p>
             <a:endParaRPr lang="en-US" dirty="0"/>
           </a:p>
         </p:txBody>
@@ -1177,7 +1328,7 @@
             <a:spLocks noGrp="1"/>
           </p:cNvSpPr>
           <p:nvPr>
-            <p:ph type="sldNum" sz="quarter" idx="10"/>
+            <p:ph type="sldNum" sz="quarter" idx="5"/>
           </p:nvPr>
         </p:nvSpPr>
         <p:spPr/>
@@ -1188,7 +1339,7 @@
             <a:fld id="{D2B72A2D-1FB5-4235-BD2A-A47C126380AE}" type="slidenum">
               <a:rPr lang="en-US" smtClean="0"/>
               <a:pPr/>
-              <a:t>4</a:t>
+              <a:t>3</a:t>
             </a:fld>
             <a:endParaRPr lang="en-US"/>
           </a:p>
@@ -1197,7 +1348,7 @@
     </p:spTree>
     <p:extLst>
       <p:ext uri="{BB962C8B-B14F-4D97-AF65-F5344CB8AC3E}">
-        <p14:creationId xmlns:p14="http://schemas.microsoft.com/office/powerpoint/2010/main" val="1914418975"/>
+        <p14:creationId xmlns:p14="http://schemas.microsoft.com/office/powerpoint/2010/main" val="2108837203"/>
       </p:ext>
     </p:extLst>
   </p:cSld>
@@ -1273,6 +1424,91 @@
             <a:fld id="{D2B72A2D-1FB5-4235-BD2A-A47C126380AE}" type="slidenum">
               <a:rPr lang="en-US" smtClean="0"/>
               <a:pPr/>
+              <a:t>4</a:t>
+            </a:fld>
+            <a:endParaRPr lang="en-US"/>
+          </a:p>
+        </p:txBody>
+      </p:sp>
+    </p:spTree>
+    <p:extLst>
+      <p:ext uri="{BB962C8B-B14F-4D97-AF65-F5344CB8AC3E}">
+        <p14:creationId xmlns:p14="http://schemas.microsoft.com/office/powerpoint/2010/main" val="1914418975"/>
+      </p:ext>
+    </p:extLst>
+  </p:cSld>
+  <p:clrMapOvr>
+    <a:masterClrMapping/>
+  </p:clrMapOvr>
+</p:notes>
+</file>
+
+<file path=ppt/notesSlides/notesSlide5.xml><?xml version="1.0" encoding="utf-8"?>
+<p:notes xmlns:a="http://schemas.openxmlformats.org/drawingml/2006/main" xmlns:r="http://schemas.openxmlformats.org/officeDocument/2006/relationships" xmlns:p="http://schemas.openxmlformats.org/presentationml/2006/main">
+  <p:cSld>
+    <p:spTree>
+      <p:nvGrpSpPr>
+        <p:cNvPr id="1" name=""/>
+        <p:cNvGrpSpPr/>
+        <p:nvPr/>
+      </p:nvGrpSpPr>
+      <p:grpSpPr>
+        <a:xfrm>
+          <a:off x="0" y="0"/>
+          <a:ext cx="0" cy="0"/>
+          <a:chOff x="0" y="0"/>
+          <a:chExt cx="0" cy="0"/>
+        </a:xfrm>
+      </p:grpSpPr>
+      <p:sp>
+        <p:nvSpPr>
+          <p:cNvPr id="2" name="Slide Image Placeholder 1"/>
+          <p:cNvSpPr>
+            <a:spLocks noGrp="1" noRot="1" noChangeAspect="1"/>
+          </p:cNvSpPr>
+          <p:nvPr>
+            <p:ph type="sldImg"/>
+          </p:nvPr>
+        </p:nvSpPr>
+        <p:spPr/>
+      </p:sp>
+      <p:sp>
+        <p:nvSpPr>
+          <p:cNvPr id="3" name="Notes Placeholder 2"/>
+          <p:cNvSpPr>
+            <a:spLocks noGrp="1"/>
+          </p:cNvSpPr>
+          <p:nvPr>
+            <p:ph type="body" idx="1"/>
+          </p:nvPr>
+        </p:nvSpPr>
+        <p:spPr/>
+        <p:txBody>
+          <a:bodyPr/>
+          <a:lstStyle/>
+          <a:p>
+            <a:endParaRPr lang="en-US" dirty="0"/>
+          </a:p>
+        </p:txBody>
+      </p:sp>
+      <p:sp>
+        <p:nvSpPr>
+          <p:cNvPr id="4" name="Slide Number Placeholder 3"/>
+          <p:cNvSpPr>
+            <a:spLocks noGrp="1"/>
+          </p:cNvSpPr>
+          <p:nvPr>
+            <p:ph type="sldNum" sz="quarter" idx="10"/>
+          </p:nvPr>
+        </p:nvSpPr>
+        <p:spPr/>
+        <p:txBody>
+          <a:bodyPr/>
+          <a:lstStyle/>
+          <a:p>
+            <a:fld id="{D2B72A2D-1FB5-4235-BD2A-A47C126380AE}" type="slidenum">
+              <a:rPr lang="en-US" smtClean="0"/>
+              <a:pPr/>
               <a:t>6</a:t>
             </a:fld>
             <a:endParaRPr lang="en-US"/>
@@ -1292,7 +1528,7 @@
 </p:notes>
 </file>
 
-<file path=ppt/notesSlides/notesSlide5.xml><?xml version="1.0" encoding="utf-8"?>
+<file path=ppt/notesSlides/notesSlide6.xml><?xml version="1.0" encoding="utf-8"?>
 <p:notes xmlns:a="http://schemas.openxmlformats.org/drawingml/2006/main" xmlns:r="http://schemas.openxmlformats.org/officeDocument/2006/relationships" xmlns:p="http://schemas.openxmlformats.org/presentationml/2006/main">
   <p:cSld>
     <p:spTree>
@@ -6726,42 +6962,6 @@
               <a:t>Mutation of Lists</a:t>
             </a:r>
           </a:p>
-          <a:p>
-            <a:pPr>
-              <a:lnSpc>
-                <a:spcPct val="90000"/>
-              </a:lnSpc>
-            </a:pPr>
-            <a:r>
-              <a:rPr lang="en-US" dirty="0"/>
-              <a:t>Practice: </a:t>
-            </a:r>
-            <a:r>
-              <a:rPr lang="en-US" dirty="0">
-                <a:latin typeface="Consolas" panose="020B0609020204030204" pitchFamily="49" charset="0"/>
-                <a:cs typeface="Consolas" panose="020B0609020204030204" pitchFamily="49" charset="0"/>
-              </a:rPr>
-              <a:t>letrec</a:t>
-            </a:r>
-            <a:r>
-              <a:rPr lang="en-US" dirty="0"/>
-              <a:t> and/or </a:t>
-            </a:r>
-            <a:r>
-              <a:rPr lang="en-US" dirty="0">
-                <a:latin typeface="+mj-lt"/>
-                <a:cs typeface="Consolas" panose="020B0609020204030204" pitchFamily="49" charset="0"/>
-              </a:rPr>
-              <a:t>named</a:t>
-            </a:r>
-            <a:r>
-              <a:rPr lang="en-US" dirty="0">
-                <a:latin typeface="Consolas" panose="020B0609020204030204" pitchFamily="49" charset="0"/>
-                <a:cs typeface="Consolas" panose="020B0609020204030204" pitchFamily="49" charset="0"/>
-              </a:rPr>
-              <a:t> let</a:t>
-            </a:r>
-          </a:p>
         </p:txBody>
       </p:sp>
     </p:spTree>
@@ -7050,48 +7250,6 @@
                 <a:latin typeface="Courier New" panose="02070309020205020404" pitchFamily="49" charset="0"/>
                 <a:cs typeface="Courier New" panose="02070309020205020404" pitchFamily="49" charset="0"/>
               </a:rPr>
-              <a:t>(map &lt; '(1 5 7) '(2 4 6))</a:t>
-            </a:r>
-          </a:p>
-          <a:p>
-            <a:pPr>
-              <a:spcBef>
-                <a:spcPts val="1028"/>
-              </a:spcBef>
-            </a:pPr>
-            <a:r>
-              <a:rPr lang="en-US" sz="2000" dirty="0">
-                <a:latin typeface="Courier New" panose="02070309020205020404" pitchFamily="49" charset="0"/>
-                <a:cs typeface="Courier New" panose="02070309020205020404" pitchFamily="49" charset="0"/>
-              </a:rPr>
-              <a:t>(map list '(1 5 7) '(2 4 6) '(0 8 3))</a:t>
-            </a:r>
-          </a:p>
-          <a:p>
-            <a:pPr>
-              <a:spcBef>
-                <a:spcPts val="1028"/>
-              </a:spcBef>
-            </a:pPr>
-            <a:r>
-              <a:rPr lang="en-US" sz="2000" dirty="0">
-                <a:latin typeface="Courier New" panose="02070309020205020404" pitchFamily="49" charset="0"/>
-                <a:cs typeface="Courier New" panose="02070309020205020404" pitchFamily="49" charset="0"/>
-              </a:rPr>
-              <a:t>(apply cons '(2 3))</a:t>
-            </a:r>
-          </a:p>
-          <a:p>
-            <a:pPr>
-              <a:spcBef>
-                <a:spcPts val="1028"/>
-              </a:spcBef>
-            </a:pPr>
-            <a:r>
-              <a:rPr lang="en-US" sz="2000" dirty="0">
-                <a:latin typeface="Courier New" panose="02070309020205020404" pitchFamily="49" charset="0"/>
-                <a:cs typeface="Courier New" panose="02070309020205020404" pitchFamily="49" charset="0"/>
-              </a:rPr>
               <a:t>(list '())      (map list '())      (apply list '())</a:t>
             </a:r>
           </a:p>
@@ -7244,120 +7402,8 @@
                 <a:latin typeface="Courier New" panose="02070309020205020404" pitchFamily="49" charset="0"/>
                 <a:cs typeface="Courier New" panose="02070309020205020404" pitchFamily="49" charset="0"/>
               </a:rPr>
-              <a:t>  (apply-many '(- cube (lambda (x) (/ x 2))) 3)</a:t>
-            </a:r>
-          </a:p>
-          <a:p>
-            <a:pPr marL="0" indent="0">
-              <a:spcBef>
-                <a:spcPts val="1028"/>
-              </a:spcBef>
-              <a:buNone/>
-            </a:pPr>
-            <a:r>
-              <a:rPr lang="en-US" sz="2000" dirty="0">
-                <a:effectLst/>
-                <a:latin typeface="Courier New" panose="02070309020205020404" pitchFamily="49" charset="0"/>
-                <a:cs typeface="Courier New" panose="02070309020205020404" pitchFamily="49" charset="0"/>
-              </a:rPr>
-              <a:t>  (apply-many `(,- ,cube ,(lambda (x) (/ x 2))) 3)</a:t>
-            </a:r>
-            <a:br>
-              <a:rPr lang="en-US" sz="2000" dirty="0">
-                <a:effectLst/>
-                <a:latin typeface="Courier New" panose="02070309020205020404" pitchFamily="49" charset="0"/>
-                <a:cs typeface="Courier New" panose="02070309020205020404" pitchFamily="49" charset="0"/>
-              </a:rPr>
-            </a:br>
-            <a:r>
-              <a:rPr lang="en-US" sz="2000" dirty="0">
-                <a:effectLst/>
-                <a:latin typeface="Courier New" panose="02070309020205020404" pitchFamily="49" charset="0"/>
-                <a:cs typeface="Courier New" panose="02070309020205020404" pitchFamily="49" charset="0"/>
-              </a:rPr>
-              <a:t>            </a:t>
-            </a:r>
-            <a:r>
-              <a:rPr lang="en-US" sz="2400" b="1" dirty="0">
-                <a:solidFill>
-                  <a:srgbClr val="FFFF00"/>
-                </a:solidFill>
-                <a:effectLst/>
-                <a:latin typeface="Calibri" panose="020F0502020204030204" pitchFamily="34" charset="0"/>
-                <a:cs typeface="Calibri" panose="020F0502020204030204" pitchFamily="34" charset="0"/>
-              </a:rPr>
-              <a:t>quasi-quote, unquote</a:t>
-            </a:r>
-          </a:p>
-          <a:p>
-            <a:pPr>
-              <a:spcBef>
-                <a:spcPts val="1028"/>
-              </a:spcBef>
-            </a:pPr>
-            <a:r>
-              <a:rPr lang="en-US" sz="2000" dirty="0">
-                <a:effectLst/>
-                <a:latin typeface="Courier New" panose="02070309020205020404" pitchFamily="49" charset="0"/>
-                <a:cs typeface="Courier New" panose="02070309020205020404" pitchFamily="49" charset="0"/>
-              </a:rPr>
-              <a:t>(apply + 1 2 '(3 4 5))</a:t>
-            </a:r>
-            <a:r>
-              <a:rPr lang="en-US" sz="2200" dirty="0">
-                <a:effectLst/>
-              </a:rPr>
-              <a:t> </a:t>
-            </a:r>
-            <a:r>
-              <a:rPr lang="en-US" sz="2200" b="1" dirty="0">
-                <a:solidFill>
-                  <a:srgbClr val="0000CC"/>
-                </a:solidFill>
-                <a:effectLst/>
-              </a:rPr>
-              <a:t>; </a:t>
-            </a:r>
-            <a:r>
-              <a:rPr lang="en-US" sz="2400" b="1" dirty="0">
-                <a:solidFill>
-                  <a:srgbClr val="FFFF00"/>
-                </a:solidFill>
-                <a:effectLst/>
-                <a:latin typeface="Calibri" panose="020F0502020204030204" pitchFamily="34" charset="0"/>
-                <a:cs typeface="Calibri" panose="020F0502020204030204" pitchFamily="34" charset="0"/>
-              </a:rPr>
-              <a:t>a </a:t>
-            </a:r>
-            <a:r>
-              <a:rPr lang="en-US" sz="2200" b="1" dirty="0">
-                <a:solidFill>
-                  <a:srgbClr val="92D050"/>
-                </a:solidFill>
-                <a:effectLst/>
-                <a:hlinkClick r:id="rId2">
-                  <a:extLst>
-                    <a:ext uri="{A12FA001-AC4F-418D-AE19-62706E023703}">
-                      <ahyp:hlinkClr xmlns:ahyp="http://schemas.microsoft.com/office/drawing/2018/hyperlinkcolor" val="tx"/>
-                    </a:ext>
-                  </a:extLst>
-                </a:hlinkClick>
-              </a:rPr>
-              <a:t>different form </a:t>
-            </a:r>
-            <a:r>
-              <a:rPr lang="en-US" sz="2400" b="1" dirty="0">
-                <a:solidFill>
-                  <a:srgbClr val="FFFF00"/>
-                </a:solidFill>
-                <a:effectLst/>
-                <a:latin typeface="Calibri" panose="020F0502020204030204" pitchFamily="34" charset="0"/>
-                <a:cs typeface="Calibri" panose="020F0502020204030204" pitchFamily="34" charset="0"/>
-              </a:rPr>
-              <a:t>of apply?</a:t>
-            </a:r>
-          </a:p>
-          <a:p>
+              <a:t>  </a:t>
+            </a:r>
             <a:endParaRPr lang="en-US" sz="2200" b="1" dirty="0">
               <a:solidFill>
                 <a:srgbClr val="0000FF"/>
@@ -7621,251 +7667,6 @@
                                           <p:spTgt spid="3">
                                             <p:txEl>
                                               <p:pRg st="4" end="4"/>
-                                            </p:txEl>
-                                          </p:spTgt>
-                                        </p:tgtEl>
-                                        <p:attrNameLst>
-                                          <p:attrName>style.visibility</p:attrName>
-                                        </p:attrNameLst>
-                                      </p:cBhvr>
-                                      <p:to>
-                                        <p:strVal val="visible"/>
-                                      </p:to>
-                                    </p:set>
-                                  </p:childTnLst>
-                                </p:cTn>
-                              </p:par>
-                            </p:childTnLst>
-                          </p:cTn>
-                        </p:par>
-                      </p:childTnLst>
-                    </p:cTn>
-                  </p:par>
-                  <p:par>
-                    <p:cTn id="23" fill="hold">
-                      <p:stCondLst>
-                        <p:cond delay="indefinite"/>
-                      </p:stCondLst>
-                      <p:childTnLst>
-                        <p:par>
-                          <p:cTn id="24" fill="hold">
-                            <p:stCondLst>
-                              <p:cond delay="0"/>
-                            </p:stCondLst>
-                            <p:childTnLst>
-                              <p:par>
-                                <p:cTn id="25" presetID="1" presetClass="entr" presetSubtype="0" fill="hold" nodeType="clickEffect">
-                                  <p:stCondLst>
-                                    <p:cond delay="0"/>
-                                  </p:stCondLst>
-                                  <p:childTnLst>
-                                    <p:set>
-                                      <p:cBhvr>
-                                        <p:cTn id="26" dur="1" fill="hold">
-                                          <p:stCondLst>
-                                            <p:cond delay="0"/>
-                                          </p:stCondLst>
-                                        </p:cTn>
-                                        <p:tgtEl>
-                                          <p:spTgt spid="3">
-                                            <p:txEl>
-                                              <p:pRg st="5" end="5"/>
-                                            </p:txEl>
-                                          </p:spTgt>
-                                        </p:tgtEl>
-                                        <p:attrNameLst>
-                                          <p:attrName>style.visibility</p:attrName>
-                                        </p:attrNameLst>
-                                      </p:cBhvr>
-                                      <p:to>
-                                        <p:strVal val="visible"/>
-                                      </p:to>
-                                    </p:set>
-                                  </p:childTnLst>
-                                </p:cTn>
-                              </p:par>
-                            </p:childTnLst>
-                          </p:cTn>
-                        </p:par>
-                      </p:childTnLst>
-                    </p:cTn>
-                  </p:par>
-                  <p:par>
-                    <p:cTn id="27" fill="hold">
-                      <p:stCondLst>
-                        <p:cond delay="indefinite"/>
-                      </p:stCondLst>
-                      <p:childTnLst>
-                        <p:par>
-                          <p:cTn id="28" fill="hold">
-                            <p:stCondLst>
-                              <p:cond delay="0"/>
-                            </p:stCondLst>
-                            <p:childTnLst>
-                              <p:par>
-                                <p:cTn id="29" presetID="1" presetClass="entr" presetSubtype="0" fill="hold" nodeType="clickEffect">
-                                  <p:stCondLst>
-                                    <p:cond delay="0"/>
-                                  </p:stCondLst>
-                                  <p:childTnLst>
-                                    <p:set>
-                                      <p:cBhvr>
-                                        <p:cTn id="30" dur="1" fill="hold">
-                                          <p:stCondLst>
-                                            <p:cond delay="0"/>
-                                          </p:stCondLst>
-                                        </p:cTn>
-                                        <p:tgtEl>
-                                          <p:spTgt spid="3">
-                                            <p:txEl>
-                                              <p:pRg st="6" end="6"/>
-                                            </p:txEl>
-                                          </p:spTgt>
-                                        </p:tgtEl>
-                                        <p:attrNameLst>
-                                          <p:attrName>style.visibility</p:attrName>
-                                        </p:attrNameLst>
-                                      </p:cBhvr>
-                                      <p:to>
-                                        <p:strVal val="visible"/>
-                                      </p:to>
-                                    </p:set>
-                                  </p:childTnLst>
-                                </p:cTn>
-                              </p:par>
-                            </p:childTnLst>
-                          </p:cTn>
-                        </p:par>
-                      </p:childTnLst>
-                    </p:cTn>
-                  </p:par>
-                  <p:par>
-                    <p:cTn id="31" fill="hold">
-                      <p:stCondLst>
-                        <p:cond delay="indefinite"/>
-                      </p:stCondLst>
-                      <p:childTnLst>
-                        <p:par>
-                          <p:cTn id="32" fill="hold">
-                            <p:stCondLst>
-                              <p:cond delay="0"/>
-                            </p:stCondLst>
-                            <p:childTnLst>
-                              <p:par>
-                                <p:cTn id="33" presetID="1" presetClass="entr" presetSubtype="0" fill="hold" nodeType="clickEffect">
-                                  <p:stCondLst>
-                                    <p:cond delay="0"/>
-                                  </p:stCondLst>
-                                  <p:childTnLst>
-                                    <p:set>
-                                      <p:cBhvr>
-                                        <p:cTn id="34" dur="1" fill="hold">
-                                          <p:stCondLst>
-                                            <p:cond delay="0"/>
-                                          </p:stCondLst>
-                                        </p:cTn>
-                                        <p:tgtEl>
-                                          <p:spTgt spid="3">
-                                            <p:txEl>
-                                              <p:pRg st="7" end="7"/>
-                                            </p:txEl>
-                                          </p:spTgt>
-                                        </p:tgtEl>
-                                        <p:attrNameLst>
-                                          <p:attrName>style.visibility</p:attrName>
-                                        </p:attrNameLst>
-                                      </p:cBhvr>
-                                      <p:to>
-                                        <p:strVal val="visible"/>
-                                      </p:to>
-                                    </p:set>
-                                  </p:childTnLst>
-                                </p:cTn>
-                              </p:par>
-                            </p:childTnLst>
-                          </p:cTn>
-                        </p:par>
-                      </p:childTnLst>
-                    </p:cTn>
-                  </p:par>
-                  <p:par>
-                    <p:cTn id="35" fill="hold">
-                      <p:stCondLst>
-                        <p:cond delay="indefinite"/>
-                      </p:stCondLst>
-                      <p:childTnLst>
-                        <p:par>
-                          <p:cTn id="36" fill="hold">
-                            <p:stCondLst>
-                              <p:cond delay="0"/>
-                            </p:stCondLst>
-                            <p:childTnLst>
-                              <p:par>
-                                <p:cTn id="37" presetID="1" presetClass="entr" presetSubtype="0" fill="hold" nodeType="clickEffect">
-                                  <p:stCondLst>
-                                    <p:cond delay="0"/>
-                                  </p:stCondLst>
-                                  <p:childTnLst>
-                                    <p:set>
-                                      <p:cBhvr>
-                                        <p:cTn id="38" dur="1" fill="hold">
-                                          <p:stCondLst>
-                                            <p:cond delay="0"/>
-                                          </p:stCondLst>
-                                        </p:cTn>
-                                        <p:tgtEl>
-                                          <p:spTgt spid="3">
-                                            <p:txEl>
-                                              <p:pRg st="8" end="8"/>
-                                            </p:txEl>
-                                          </p:spTgt>
-                                        </p:tgtEl>
-                                        <p:attrNameLst>
-                                          <p:attrName>style.visibility</p:attrName>
-                                        </p:attrNameLst>
-                                      </p:cBhvr>
-                                      <p:to>
-                                        <p:strVal val="visible"/>
-                                      </p:to>
-                                    </p:set>
-                                  </p:childTnLst>
-                                </p:cTn>
-                              </p:par>
-                            </p:childTnLst>
-                          </p:cTn>
-                        </p:par>
-                      </p:childTnLst>
-                    </p:cTn>
-                  </p:par>
-                  <p:par>
-                    <p:cTn id="39" fill="hold">
-                      <p:stCondLst>
-                        <p:cond delay="indefinite"/>
-                      </p:stCondLst>
-                      <p:childTnLst>
-                        <p:par>
-                          <p:cTn id="40" fill="hold">
-                            <p:stCondLst>
-                              <p:cond delay="0"/>
-                            </p:stCondLst>
-                            <p:childTnLst>
-                              <p:par>
-                                <p:cTn id="41" presetID="1" presetClass="entr" presetSubtype="0" fill="hold" nodeType="clickEffect">
-                                  <p:stCondLst>
-                                    <p:cond delay="0"/>
-                                  </p:stCondLst>
-                                  <p:childTnLst>
-                                    <p:set>
-                                      <p:cBhvr>
-                                        <p:cTn id="42" dur="1" fill="hold">
-                                          <p:stCondLst>
-                                            <p:cond delay="0"/>
-                                          </p:stCondLst>
-                                        </p:cTn>
-                                        <p:tgtEl>
-                                          <p:spTgt spid="3">
-                                            <p:txEl>
-                                              <p:pRg st="9" end="9"/>
                                             </p:txEl>
                                           </p:spTgt>
                                         </p:tgtEl>

</xml_diff>

<commit_message>
add solution to box and pointer execise
</commit_message>
<xml_diff>
--- a/ClassMaterials/OddsAndEnds/06-OddsAndEnds.pptx
+++ b/ClassMaterials/OddsAndEnds/06-OddsAndEnds.pptx
@@ -5,10 +5,10 @@
     <p:sldMasterId id="2147483695" r:id="rId1"/>
   </p:sldMasterIdLst>
   <p:notesMasterIdLst>
-    <p:notesMasterId r:id="rId9"/>
+    <p:notesMasterId r:id="rId11"/>
   </p:notesMasterIdLst>
   <p:handoutMasterIdLst>
-    <p:handoutMasterId r:id="rId10"/>
+    <p:handoutMasterId r:id="rId12"/>
   </p:handoutMasterIdLst>
   <p:sldIdLst>
     <p:sldId id="257" r:id="rId2"/>
@@ -17,7 +17,9 @@
     <p:sldId id="306" r:id="rId5"/>
     <p:sldId id="355" r:id="rId6"/>
     <p:sldId id="354" r:id="rId7"/>
-    <p:sldId id="352" r:id="rId8"/>
+    <p:sldId id="356" r:id="rId8"/>
+    <p:sldId id="357" r:id="rId9"/>
+    <p:sldId id="352" r:id="rId10"/>
   </p:sldIdLst>
   <p:sldSz cx="9144000" cy="6858000" type="screen4x3"/>
   <p:notesSz cx="7315200" cy="9601200"/>
@@ -168,7 +170,7 @@
 <file path=ppt/revisionInfo.xml><?xml version="1.0" encoding="utf-8"?>
 <p1510:revInfo xmlns:a="http://schemas.openxmlformats.org/drawingml/2006/main" xmlns:r="http://schemas.openxmlformats.org/officeDocument/2006/relationships" xmlns:p1510="http://schemas.microsoft.com/office/powerpoint/2015/10/main">
   <p1510:revLst>
-    <p1510:client id="{37C8A5DD-6230-4952-8DEE-7C479736230B}" v="107" dt="2021-09-10T17:20:26.485"/>
+    <p1510:client id="{37C8A5DD-6230-4952-8DEE-7C479736230B}" v="276" dt="2021-09-10T17:57:49.415"/>
   </p1510:revLst>
 </p1510:revInfo>
 </file>
@@ -178,7 +180,7 @@
   <pc:docChgLst>
     <pc:chgData name="Hewner, Mike" userId="7f3f83dd-6dfb-4127-a87f-c1714bd4fac9" providerId="ADAL" clId="{37C8A5DD-6230-4952-8DEE-7C479736230B}"/>
     <pc:docChg chg="undo custSel addSld delSld modSld">
-      <pc:chgData name="Hewner, Mike" userId="7f3f83dd-6dfb-4127-a87f-c1714bd4fac9" providerId="ADAL" clId="{37C8A5DD-6230-4952-8DEE-7C479736230B}" dt="2021-09-10T17:20:26.485" v="463" actId="20577"/>
+      <pc:chgData name="Hewner, Mike" userId="7f3f83dd-6dfb-4127-a87f-c1714bd4fac9" providerId="ADAL" clId="{37C8A5DD-6230-4952-8DEE-7C479736230B}" dt="2021-09-10T18:04:56.089" v="744" actId="404"/>
       <pc:docMkLst>
         <pc:docMk/>
       </pc:docMkLst>
@@ -205,13 +207,13 @@
         </pc:sldMkLst>
       </pc:sldChg>
       <pc:sldChg chg="modSp mod modAnim modNotesTx">
-        <pc:chgData name="Hewner, Mike" userId="7f3f83dd-6dfb-4127-a87f-c1714bd4fac9" providerId="ADAL" clId="{37C8A5DD-6230-4952-8DEE-7C479736230B}" dt="2021-09-10T17:20:26.485" v="463" actId="20577"/>
+        <pc:chgData name="Hewner, Mike" userId="7f3f83dd-6dfb-4127-a87f-c1714bd4fac9" providerId="ADAL" clId="{37C8A5DD-6230-4952-8DEE-7C479736230B}" dt="2021-09-10T17:31:07.193" v="631" actId="12"/>
         <pc:sldMkLst>
           <pc:docMk/>
           <pc:sldMk cId="3615081806" sldId="315"/>
         </pc:sldMkLst>
         <pc:spChg chg="mod">
-          <ac:chgData name="Hewner, Mike" userId="7f3f83dd-6dfb-4127-a87f-c1714bd4fac9" providerId="ADAL" clId="{37C8A5DD-6230-4952-8DEE-7C479736230B}" dt="2021-09-10T17:20:26.485" v="463" actId="20577"/>
+          <ac:chgData name="Hewner, Mike" userId="7f3f83dd-6dfb-4127-a87f-c1714bd4fac9" providerId="ADAL" clId="{37C8A5DD-6230-4952-8DEE-7C479736230B}" dt="2021-09-10T17:31:07.193" v="631" actId="12"/>
           <ac:spMkLst>
             <pc:docMk/>
             <pc:sldMk cId="3615081806" sldId="315"/>
@@ -262,6 +264,68 @@
             <pc:docMk/>
             <pc:sldMk cId="716704612" sldId="355"/>
             <ac:spMk id="3" creationId="{B0425137-20E3-41AF-B792-60F97587CF7F}"/>
+          </ac:spMkLst>
+        </pc:spChg>
+      </pc:sldChg>
+      <pc:sldChg chg="addSp delSp modSp new mod">
+        <pc:chgData name="Hewner, Mike" userId="7f3f83dd-6dfb-4127-a87f-c1714bd4fac9" providerId="ADAL" clId="{37C8A5DD-6230-4952-8DEE-7C479736230B}" dt="2021-09-10T18:00:43.932" v="727" actId="20577"/>
+        <pc:sldMkLst>
+          <pc:docMk/>
+          <pc:sldMk cId="3911872155" sldId="356"/>
+        </pc:sldMkLst>
+        <pc:spChg chg="mod">
+          <ac:chgData name="Hewner, Mike" userId="7f3f83dd-6dfb-4127-a87f-c1714bd4fac9" providerId="ADAL" clId="{37C8A5DD-6230-4952-8DEE-7C479736230B}" dt="2021-09-10T17:57:06.442" v="636" actId="404"/>
+          <ac:spMkLst>
+            <pc:docMk/>
+            <pc:sldMk cId="3911872155" sldId="356"/>
+            <ac:spMk id="3" creationId="{E5BE192C-E792-44B6-94D2-A018FF5D6073}"/>
+          </ac:spMkLst>
+        </pc:spChg>
+        <pc:spChg chg="del">
+          <ac:chgData name="Hewner, Mike" userId="7f3f83dd-6dfb-4127-a87f-c1714bd4fac9" providerId="ADAL" clId="{37C8A5DD-6230-4952-8DEE-7C479736230B}" dt="2021-09-10T17:57:28.682" v="637" actId="22"/>
+          <ac:spMkLst>
+            <pc:docMk/>
+            <pc:sldMk cId="3911872155" sldId="356"/>
+            <ac:spMk id="4" creationId="{ABD8F577-6564-4EDE-93BD-79F131278732}"/>
+          </ac:spMkLst>
+        </pc:spChg>
+        <pc:spChg chg="add mod">
+          <ac:chgData name="Hewner, Mike" userId="7f3f83dd-6dfb-4127-a87f-c1714bd4fac9" providerId="ADAL" clId="{37C8A5DD-6230-4952-8DEE-7C479736230B}" dt="2021-09-10T18:00:43.932" v="727" actId="20577"/>
+          <ac:spMkLst>
+            <pc:docMk/>
+            <pc:sldMk cId="3911872155" sldId="356"/>
+            <ac:spMk id="7" creationId="{82A5D9F0-2710-4D5D-876C-734D2F83689D}"/>
+          </ac:spMkLst>
+        </pc:spChg>
+        <pc:picChg chg="add mod ord">
+          <ac:chgData name="Hewner, Mike" userId="7f3f83dd-6dfb-4127-a87f-c1714bd4fac9" providerId="ADAL" clId="{37C8A5DD-6230-4952-8DEE-7C479736230B}" dt="2021-09-10T17:57:31.604" v="638" actId="1076"/>
+          <ac:picMkLst>
+            <pc:docMk/>
+            <pc:sldMk cId="3911872155" sldId="356"/>
+            <ac:picMk id="6" creationId="{0AB2E648-72C3-42F2-BEA3-F49A440A35D6}"/>
+          </ac:picMkLst>
+        </pc:picChg>
+      </pc:sldChg>
+      <pc:sldChg chg="modSp new mod">
+        <pc:chgData name="Hewner, Mike" userId="7f3f83dd-6dfb-4127-a87f-c1714bd4fac9" providerId="ADAL" clId="{37C8A5DD-6230-4952-8DEE-7C479736230B}" dt="2021-09-10T18:04:56.089" v="744" actId="404"/>
+        <pc:sldMkLst>
+          <pc:docMk/>
+          <pc:sldMk cId="1460356269" sldId="357"/>
+        </pc:sldMkLst>
+        <pc:spChg chg="mod">
+          <ac:chgData name="Hewner, Mike" userId="7f3f83dd-6dfb-4127-a87f-c1714bd4fac9" providerId="ADAL" clId="{37C8A5DD-6230-4952-8DEE-7C479736230B}" dt="2021-09-10T18:04:56.089" v="744" actId="404"/>
+          <ac:spMkLst>
+            <pc:docMk/>
+            <pc:sldMk cId="1460356269" sldId="357"/>
+            <ac:spMk id="3" creationId="{76C38D3E-A98A-48FF-AC9F-3512860CC05A}"/>
+          </ac:spMkLst>
+        </pc:spChg>
+        <pc:spChg chg="mod">
+          <ac:chgData name="Hewner, Mike" userId="7f3f83dd-6dfb-4127-a87f-c1714bd4fac9" providerId="ADAL" clId="{37C8A5DD-6230-4952-8DEE-7C479736230B}" dt="2021-09-10T18:04:24.803" v="737" actId="404"/>
+          <ac:spMkLst>
+            <pc:docMk/>
+            <pc:sldMk cId="1460356269" sldId="357"/>
+            <ac:spMk id="4" creationId="{59F696AA-DB46-4FAD-B7BA-17F2CB557544}"/>
           </ac:spMkLst>
         </pc:spChg>
       </pc:sldChg>
@@ -1569,6 +1633,91 @@
         </p:nvSpPr>
         <p:spPr/>
         <p:txBody>
+          <a:bodyPr/>
+          <a:lstStyle/>
+          <a:p>
+            <a:endParaRPr lang="en-US" dirty="0"/>
+          </a:p>
+        </p:txBody>
+      </p:sp>
+      <p:sp>
+        <p:nvSpPr>
+          <p:cNvPr id="4" name="Slide Number Placeholder 3"/>
+          <p:cNvSpPr>
+            <a:spLocks noGrp="1"/>
+          </p:cNvSpPr>
+          <p:nvPr>
+            <p:ph type="sldNum" sz="quarter" idx="5"/>
+          </p:nvPr>
+        </p:nvSpPr>
+        <p:spPr/>
+        <p:txBody>
+          <a:bodyPr/>
+          <a:lstStyle/>
+          <a:p>
+            <a:fld id="{D2B72A2D-1FB5-4235-BD2A-A47C126380AE}" type="slidenum">
+              <a:rPr lang="en-US" smtClean="0"/>
+              <a:pPr/>
+              <a:t>7</a:t>
+            </a:fld>
+            <a:endParaRPr lang="en-US"/>
+          </a:p>
+        </p:txBody>
+      </p:sp>
+    </p:spTree>
+    <p:extLst>
+      <p:ext uri="{BB962C8B-B14F-4D97-AF65-F5344CB8AC3E}">
+        <p14:creationId xmlns:p14="http://schemas.microsoft.com/office/powerpoint/2010/main" val="3402751023"/>
+      </p:ext>
+    </p:extLst>
+  </p:cSld>
+  <p:clrMapOvr>
+    <a:masterClrMapping/>
+  </p:clrMapOvr>
+</p:notes>
+</file>
+
+<file path=ppt/notesSlides/notesSlide7.xml><?xml version="1.0" encoding="utf-8"?>
+<p:notes xmlns:a="http://schemas.openxmlformats.org/drawingml/2006/main" xmlns:r="http://schemas.openxmlformats.org/officeDocument/2006/relationships" xmlns:p="http://schemas.openxmlformats.org/presentationml/2006/main">
+  <p:cSld>
+    <p:spTree>
+      <p:nvGrpSpPr>
+        <p:cNvPr id="1" name=""/>
+        <p:cNvGrpSpPr/>
+        <p:nvPr/>
+      </p:nvGrpSpPr>
+      <p:grpSpPr>
+        <a:xfrm>
+          <a:off x="0" y="0"/>
+          <a:ext cx="0" cy="0"/>
+          <a:chOff x="0" y="0"/>
+          <a:chExt cx="0" cy="0"/>
+        </a:xfrm>
+      </p:grpSpPr>
+      <p:sp>
+        <p:nvSpPr>
+          <p:cNvPr id="2" name="Slide Image Placeholder 1"/>
+          <p:cNvSpPr>
+            <a:spLocks noGrp="1" noRot="1" noChangeAspect="1"/>
+          </p:cNvSpPr>
+          <p:nvPr>
+            <p:ph type="sldImg"/>
+          </p:nvPr>
+        </p:nvSpPr>
+        <p:spPr/>
+      </p:sp>
+      <p:sp>
+        <p:nvSpPr>
+          <p:cNvPr id="3" name="Notes Placeholder 2"/>
+          <p:cNvSpPr>
+            <a:spLocks noGrp="1"/>
+          </p:cNvSpPr>
+          <p:nvPr>
+            <p:ph type="body" idx="1"/>
+          </p:nvPr>
+        </p:nvSpPr>
+        <p:spPr/>
+        <p:txBody>
           <a:bodyPr>
             <a:normAutofit/>
           </a:bodyPr>
@@ -1596,7 +1745,7 @@
             <a:fld id="{D2B72A2D-1FB5-4235-BD2A-A47C126380AE}" type="slidenum">
               <a:rPr lang="en-US" smtClean="0"/>
               <a:pPr/>
-              <a:t>7</a:t>
+              <a:t>9</a:t>
             </a:fld>
             <a:endParaRPr lang="en-US"/>
           </a:p>
@@ -7240,140 +7389,6 @@
           <a:bodyPr/>
           <a:lstStyle/>
           <a:p>
-            <a:pPr>
-              <a:spcBef>
-                <a:spcPts val="1028"/>
-              </a:spcBef>
-            </a:pPr>
-            <a:r>
-              <a:rPr lang="en-US" sz="2000" dirty="0">
-                <a:latin typeface="Courier New" panose="02070309020205020404" pitchFamily="49" charset="0"/>
-                <a:cs typeface="Courier New" panose="02070309020205020404" pitchFamily="49" charset="0"/>
-              </a:rPr>
-              <a:t>(list '())      (map list '())      (apply list '())</a:t>
-            </a:r>
-          </a:p>
-          <a:p>
-            <a:pPr>
-              <a:spcBef>
-                <a:spcPts val="1028"/>
-              </a:spcBef>
-            </a:pPr>
-            <a:r>
-              <a:rPr lang="en-US" sz="2000" dirty="0">
-                <a:latin typeface="Courier New" panose="02070309020205020404" pitchFamily="49" charset="0"/>
-                <a:cs typeface="Courier New" panose="02070309020205020404" pitchFamily="49" charset="0"/>
-              </a:rPr>
-              <a:t>(define cube (lambda(x) (* x </a:t>
-            </a:r>
-            <a:r>
-              <a:rPr lang="en-US" sz="2000" dirty="0" err="1">
-                <a:latin typeface="Courier New" panose="02070309020205020404" pitchFamily="49" charset="0"/>
-                <a:cs typeface="Courier New" panose="02070309020205020404" pitchFamily="49" charset="0"/>
-              </a:rPr>
-              <a:t>x</a:t>
-            </a:r>
-            <a:r>
-              <a:rPr lang="en-US" sz="2000" dirty="0">
-                <a:latin typeface="Courier New" panose="02070309020205020404" pitchFamily="49" charset="0"/>
-                <a:cs typeface="Courier New" panose="02070309020205020404" pitchFamily="49" charset="0"/>
-              </a:rPr>
-              <a:t> x)))</a:t>
-            </a:r>
-          </a:p>
-          <a:p>
-            <a:pPr>
-              <a:spcBef>
-                <a:spcPts val="1028"/>
-              </a:spcBef>
-            </a:pPr>
-            <a:r>
-              <a:rPr lang="en-US" sz="2000" dirty="0">
-                <a:effectLst/>
-                <a:latin typeface="Courier New" panose="02070309020205020404" pitchFamily="49" charset="0"/>
-                <a:cs typeface="Courier New" panose="02070309020205020404" pitchFamily="49" charset="0"/>
-              </a:rPr>
-              <a:t>(define (apply-many functions </a:t>
-            </a:r>
-            <a:r>
-              <a:rPr lang="en-US" sz="2000" dirty="0" err="1">
-                <a:effectLst/>
-                <a:latin typeface="Courier New" panose="02070309020205020404" pitchFamily="49" charset="0"/>
-                <a:cs typeface="Courier New" panose="02070309020205020404" pitchFamily="49" charset="0"/>
-              </a:rPr>
-              <a:t>arg</a:t>
-            </a:r>
-            <a:r>
-              <a:rPr lang="en-US" sz="2000" dirty="0">
-                <a:effectLst/>
-                <a:latin typeface="Courier New" panose="02070309020205020404" pitchFamily="49" charset="0"/>
-                <a:cs typeface="Courier New" panose="02070309020205020404" pitchFamily="49" charset="0"/>
-              </a:rPr>
-              <a:t>)</a:t>
-            </a:r>
-            <a:br>
-              <a:rPr lang="en-US" sz="2000" dirty="0">
-                <a:effectLst/>
-                <a:latin typeface="Courier New" panose="02070309020205020404" pitchFamily="49" charset="0"/>
-                <a:cs typeface="Courier New" panose="02070309020205020404" pitchFamily="49" charset="0"/>
-              </a:rPr>
-            </a:br>
-            <a:r>
-              <a:rPr lang="en-US" sz="2000" dirty="0">
-                <a:effectLst/>
-                <a:latin typeface="Courier New" panose="02070309020205020404" pitchFamily="49" charset="0"/>
-                <a:cs typeface="Courier New" panose="02070309020205020404" pitchFamily="49" charset="0"/>
-              </a:rPr>
-              <a:t>     (map (lambda (function) </a:t>
-            </a:r>
-            <a:br>
-              <a:rPr lang="en-US" sz="2000" dirty="0">
-                <a:effectLst/>
-                <a:latin typeface="Courier New" panose="02070309020205020404" pitchFamily="49" charset="0"/>
-                <a:cs typeface="Courier New" panose="02070309020205020404" pitchFamily="49" charset="0"/>
-              </a:rPr>
-            </a:br>
-            <a:r>
-              <a:rPr lang="en-US" sz="2000" dirty="0">
-                <a:effectLst/>
-                <a:latin typeface="Courier New" panose="02070309020205020404" pitchFamily="49" charset="0"/>
-                <a:cs typeface="Courier New" panose="02070309020205020404" pitchFamily="49" charset="0"/>
-              </a:rPr>
-              <a:t>	            (apply function (list </a:t>
-            </a:r>
-            <a:r>
-              <a:rPr lang="en-US" sz="2000" dirty="0" err="1">
-                <a:effectLst/>
-                <a:latin typeface="Courier New" panose="02070309020205020404" pitchFamily="49" charset="0"/>
-                <a:cs typeface="Courier New" panose="02070309020205020404" pitchFamily="49" charset="0"/>
-              </a:rPr>
-              <a:t>arg</a:t>
-            </a:r>
-            <a:r>
-              <a:rPr lang="en-US" sz="2000" dirty="0">
-                <a:effectLst/>
-                <a:latin typeface="Courier New" panose="02070309020205020404" pitchFamily="49" charset="0"/>
-                <a:cs typeface="Courier New" panose="02070309020205020404" pitchFamily="49" charset="0"/>
-              </a:rPr>
-              <a:t>))) </a:t>
-            </a:r>
-            <a:br>
-              <a:rPr lang="en-US" sz="2000" dirty="0">
-                <a:effectLst/>
-                <a:latin typeface="Courier New" panose="02070309020205020404" pitchFamily="49" charset="0"/>
-                <a:cs typeface="Courier New" panose="02070309020205020404" pitchFamily="49" charset="0"/>
-              </a:rPr>
-            </a:br>
-            <a:r>
-              <a:rPr lang="en-US" sz="2000" dirty="0">
-                <a:effectLst/>
-                <a:latin typeface="Courier New" panose="02070309020205020404" pitchFamily="49" charset="0"/>
-                <a:cs typeface="Courier New" panose="02070309020205020404" pitchFamily="49" charset="0"/>
-              </a:rPr>
-              <a:t>          functions))</a:t>
-            </a:r>
-          </a:p>
-          <a:p>
             <a:pPr marL="0" indent="0">
               <a:spcBef>
                 <a:spcPts val="1028"/>
@@ -7382,12 +7397,152 @@
             </a:pPr>
             <a:r>
               <a:rPr lang="en-US" sz="2000" dirty="0">
+                <a:latin typeface="Courier New" panose="02070309020205020404" pitchFamily="49" charset="0"/>
+                <a:cs typeface="Courier New" panose="02070309020205020404" pitchFamily="49" charset="0"/>
+              </a:rPr>
+              <a:t>What do each of these return?</a:t>
+            </a:r>
+          </a:p>
+          <a:p>
+            <a:pPr>
+              <a:spcBef>
+                <a:spcPts val="1028"/>
+              </a:spcBef>
+            </a:pPr>
+            <a:r>
+              <a:rPr lang="en-US" sz="2000" dirty="0">
+                <a:latin typeface="Courier New" panose="02070309020205020404" pitchFamily="49" charset="0"/>
+                <a:cs typeface="Courier New" panose="02070309020205020404" pitchFamily="49" charset="0"/>
+              </a:rPr>
+              <a:t>(list '())      (map list '())      (apply list '())</a:t>
+            </a:r>
+          </a:p>
+          <a:p>
+            <a:pPr marL="0" indent="0">
+              <a:buNone/>
+            </a:pPr>
+            <a:endParaRPr lang="en-US" dirty="0">
+              <a:effectLst/>
+            </a:endParaRPr>
+          </a:p>
+          <a:p>
+            <a:r>
+              <a:rPr lang="en-US" sz="1800" dirty="0">
+                <a:effectLst/>
+                <a:latin typeface="Consolas" panose="020B0609020204030204" pitchFamily="49" charset="0"/>
+              </a:rPr>
+              <a:t>(define (apply-many functions </a:t>
+            </a:r>
+            <a:r>
+              <a:rPr lang="en-US" sz="1800" dirty="0" err="1">
+                <a:effectLst/>
+                <a:latin typeface="Consolas" panose="020B0609020204030204" pitchFamily="49" charset="0"/>
+              </a:rPr>
+              <a:t>arg</a:t>
+            </a:r>
+            <a:r>
+              <a:rPr lang="en-US" sz="1800" dirty="0">
+                <a:effectLst/>
+                <a:latin typeface="Consolas" panose="020B0609020204030204" pitchFamily="49" charset="0"/>
+              </a:rPr>
+              <a:t>)</a:t>
+            </a:r>
+          </a:p>
+          <a:p>
+            <a:pPr marL="0" indent="0">
+              <a:buNone/>
+            </a:pPr>
+            <a:r>
+              <a:rPr lang="en-US" sz="1800" dirty="0">
+                <a:effectLst/>
+                <a:latin typeface="Consolas" panose="020B0609020204030204" pitchFamily="49" charset="0"/>
+              </a:rPr>
+              <a:t>     (map (lambda (function) </a:t>
+            </a:r>
+          </a:p>
+          <a:p>
+            <a:pPr marL="0" indent="0">
+              <a:buNone/>
+            </a:pPr>
+            <a:r>
+              <a:rPr lang="en-US" sz="1800" dirty="0">
+                <a:effectLst/>
+                <a:latin typeface="Consolas" panose="020B0609020204030204" pitchFamily="49" charset="0"/>
+              </a:rPr>
+              <a:t>        (function </a:t>
+            </a:r>
+            <a:r>
+              <a:rPr lang="en-US" sz="1800" dirty="0" err="1">
+                <a:effectLst/>
+                <a:latin typeface="Consolas" panose="020B0609020204030204" pitchFamily="49" charset="0"/>
+              </a:rPr>
+              <a:t>arg</a:t>
+            </a:r>
+            <a:r>
+              <a:rPr lang="en-US" sz="1800" dirty="0">
+                <a:effectLst/>
+                <a:latin typeface="Consolas" panose="020B0609020204030204" pitchFamily="49" charset="0"/>
+              </a:rPr>
+              <a:t>)) functions))</a:t>
+            </a:r>
+          </a:p>
+          <a:p>
+            <a:pPr marL="0" indent="0">
+              <a:spcBef>
+                <a:spcPts val="1028"/>
+              </a:spcBef>
+              <a:buNone/>
+            </a:pPr>
+            <a:r>
+              <a:rPr lang="en-US" sz="2000" dirty="0">
                 <a:effectLst/>
                 <a:latin typeface="Courier New" panose="02070309020205020404" pitchFamily="49" charset="0"/>
                 <a:cs typeface="Courier New" panose="02070309020205020404" pitchFamily="49" charset="0"/>
               </a:rPr>
-              <a:t>  (apply-many (list - cube (lambda (x) (/ x 2))) 3) </a:t>
-            </a:r>
+              <a:t>(apply-many (list - cube (lambda (x) (/ x 2))) 3)</a:t>
+            </a:r>
+          </a:p>
+          <a:p>
+            <a:pPr marL="0" indent="0">
+              <a:spcBef>
+                <a:spcPts val="1028"/>
+              </a:spcBef>
+              <a:buNone/>
+            </a:pPr>
+            <a:endParaRPr lang="en-US" sz="2000" dirty="0">
+              <a:effectLst/>
+              <a:latin typeface="Courier New" panose="02070309020205020404" pitchFamily="49" charset="0"/>
+              <a:cs typeface="Courier New" panose="02070309020205020404" pitchFamily="49" charset="0"/>
+            </a:endParaRPr>
+          </a:p>
+          <a:p>
+            <a:pPr marL="0" indent="0">
+              <a:spcBef>
+                <a:spcPts val="1028"/>
+              </a:spcBef>
+              <a:buNone/>
+            </a:pPr>
+            <a:r>
+              <a:rPr lang="en-US" sz="2000" dirty="0">
+                <a:effectLst/>
+                <a:latin typeface="Courier New" panose="02070309020205020404" pitchFamily="49" charset="0"/>
+                <a:cs typeface="Courier New" panose="02070309020205020404" pitchFamily="49" charset="0"/>
+              </a:rPr>
+              <a:t>If you like, broaden apply many to allow arbitrary numbers of arguments</a:t>
+            </a:r>
+          </a:p>
+          <a:p>
+            <a:pPr marL="0" indent="0">
+              <a:spcBef>
+                <a:spcPts val="1028"/>
+              </a:spcBef>
+              <a:buNone/>
+            </a:pPr>
+            <a:endParaRPr lang="en-US" sz="2000" dirty="0">
+              <a:effectLst/>
+              <a:latin typeface="Courier New" panose="02070309020205020404" pitchFamily="49" charset="0"/>
+              <a:cs typeface="Courier New" panose="02070309020205020404" pitchFamily="49" charset="0"/>
+            </a:endParaRPr>
           </a:p>
           <a:p>
             <a:pPr marL="0" indent="0">
@@ -7470,7 +7625,7 @@
                                         <p:tgtEl>
                                           <p:spTgt spid="3">
                                             <p:txEl>
-                                              <p:pRg st="0" end="0"/>
+                                              <p:pRg st="1" end="1"/>
                                             </p:txEl>
                                           </p:spTgt>
                                         </p:tgtEl>
@@ -7519,7 +7674,7 @@
                                         <p:tgtEl>
                                           <p:spTgt spid="3">
                                             <p:txEl>
-                                              <p:pRg st="1" end="1"/>
+                                              <p:pRg st="0" end="0"/>
                                             </p:txEl>
                                           </p:spTgt>
                                         </p:tgtEl>
@@ -7568,7 +7723,7 @@
                                         <p:tgtEl>
                                           <p:spTgt spid="3">
                                             <p:txEl>
-                                              <p:pRg st="2" end="2"/>
+                                              <p:pRg st="6" end="6"/>
                                             </p:txEl>
                                           </p:spTgt>
                                         </p:tgtEl>
@@ -7687,6 +7842,153 @@
                       </p:childTnLst>
                     </p:cTn>
                   </p:par>
+                  <p:par>
+                    <p:cTn id="23" fill="hold">
+                      <p:stCondLst>
+                        <p:cond delay="indefinite"/>
+                      </p:stCondLst>
+                      <p:childTnLst>
+                        <p:par>
+                          <p:cTn id="24" fill="hold">
+                            <p:stCondLst>
+                              <p:cond delay="0"/>
+                            </p:stCondLst>
+                            <p:childTnLst>
+                              <p:par>
+                                <p:cTn id="25" presetID="1" presetClass="entr" presetSubtype="0" fill="hold" nodeType="clickEffect">
+                                  <p:stCondLst>
+                                    <p:cond delay="0"/>
+                                  </p:stCondLst>
+                                  <p:childTnLst>
+                                    <p:set>
+                                      <p:cBhvr>
+                                        <p:cTn id="26" dur="1" fill="hold">
+                                          <p:stCondLst>
+                                            <p:cond delay="0"/>
+                                          </p:stCondLst>
+                                        </p:cTn>
+                                        <p:tgtEl>
+                                          <p:spTgt spid="3">
+                                            <p:txEl>
+                                              <p:pRg st="5" end="5"/>
+                                            </p:txEl>
+                                          </p:spTgt>
+                                        </p:tgtEl>
+                                        <p:attrNameLst>
+                                          <p:attrName>style.visibility</p:attrName>
+                                        </p:attrNameLst>
+                                      </p:cBhvr>
+                                      <p:to>
+                                        <p:strVal val="visible"/>
+                                      </p:to>
+                                    </p:set>
+                                  </p:childTnLst>
+                                </p:cTn>
+                              </p:par>
+                            </p:childTnLst>
+                          </p:cTn>
+                        </p:par>
+                      </p:childTnLst>
+                    </p:cTn>
+                  </p:par>
+                  <p:par>
+                    <p:cTn id="27" fill="hold">
+                      <p:stCondLst>
+                        <p:cond delay="indefinite"/>
+                      </p:stCondLst>
+                      <p:childTnLst>
+                        <p:par>
+                          <p:cTn id="28" fill="hold">
+                            <p:stCondLst>
+                              <p:cond delay="0"/>
+                            </p:stCondLst>
+                            <p:childTnLst>
+                              <p:par>
+                                <p:cTn id="29" presetID="1" presetClass="entr" presetSubtype="0" fill="hold" nodeType="clickEffect">
+                                  <p:stCondLst>
+                                    <p:cond delay="0"/>
+                                  </p:stCondLst>
+                                  <p:childTnLst>
+                                    <p:set>
+                                      <p:cBhvr>
+                                        <p:cTn id="30" dur="1" fill="hold">
+                                          <p:stCondLst>
+                                            <p:cond delay="0"/>
+                                          </p:stCondLst>
+                                        </p:cTn>
+                                        <p:tgtEl>
+                                          <p:spTgt spid="3">
+                                            <p:txEl>
+                                              <p:pRg st="8" end="8"/>
+                                            </p:txEl>
+                                          </p:spTgt>
+                                        </p:tgtEl>
+                                        <p:attrNameLst>
+                                          <p:attrName>style.visibility</p:attrName>
+                                        </p:attrNameLst>
+                                      </p:cBhvr>
+                                      <p:to>
+                                        <p:strVal val="visible"/>
+                                      </p:to>
+                                    </p:set>
+                                  </p:childTnLst>
+                                </p:cTn>
+                              </p:par>
+                            </p:childTnLst>
+                          </p:cTn>
+                        </p:par>
+                      </p:childTnLst>
+                    </p:cTn>
+                  </p:par>
+                  <p:par>
+                    <p:cTn id="31" fill="hold">
+                      <p:stCondLst>
+                        <p:cond delay="indefinite"/>
+                      </p:stCondLst>
+                      <p:childTnLst>
+                        <p:par>
+                          <p:cTn id="32" fill="hold">
+                            <p:stCondLst>
+                              <p:cond delay="0"/>
+                            </p:stCondLst>
+                            <p:childTnLst>
+                              <p:par>
+                                <p:cTn id="33" presetID="1" presetClass="entr" presetSubtype="0" fill="hold" nodeType="clickEffect">
+                                  <p:stCondLst>
+                                    <p:cond delay="0"/>
+                                  </p:stCondLst>
+                                  <p:childTnLst>
+                                    <p:set>
+                                      <p:cBhvr>
+                                        <p:cTn id="34" dur="1" fill="hold">
+                                          <p:stCondLst>
+                                            <p:cond delay="0"/>
+                                          </p:stCondLst>
+                                        </p:cTn>
+                                        <p:tgtEl>
+                                          <p:spTgt spid="3">
+                                            <p:txEl>
+                                              <p:pRg st="10" end="10"/>
+                                            </p:txEl>
+                                          </p:spTgt>
+                                        </p:tgtEl>
+                                        <p:attrNameLst>
+                                          <p:attrName>style.visibility</p:attrName>
+                                        </p:attrNameLst>
+                                      </p:cBhvr>
+                                      <p:to>
+                                        <p:strVal val="visible"/>
+                                      </p:to>
+                                    </p:set>
+                                  </p:childTnLst>
+                                </p:cTn>
+                              </p:par>
+                            </p:childTnLst>
+                          </p:cTn>
+                        </p:par>
+                      </p:childTnLst>
+                    </p:cTn>
+                  </p:par>
                 </p:childTnLst>
               </p:cTn>
               <p:prevCondLst>
@@ -8515,6 +8817,785 @@
 </file>
 
 <file path=ppt/slides/slide7.xml><?xml version="1.0" encoding="utf-8"?>
+<p:sld xmlns:a="http://schemas.openxmlformats.org/drawingml/2006/main" xmlns:r="http://schemas.openxmlformats.org/officeDocument/2006/relationships" xmlns:p="http://schemas.openxmlformats.org/presentationml/2006/main">
+  <p:cSld>
+    <p:spTree>
+      <p:nvGrpSpPr>
+        <p:cNvPr id="1" name=""/>
+        <p:cNvGrpSpPr/>
+        <p:nvPr/>
+      </p:nvGrpSpPr>
+      <p:grpSpPr>
+        <a:xfrm>
+          <a:off x="0" y="0"/>
+          <a:ext cx="0" cy="0"/>
+          <a:chOff x="0" y="0"/>
+          <a:chExt cx="0" cy="0"/>
+        </a:xfrm>
+      </p:grpSpPr>
+      <p:sp>
+        <p:nvSpPr>
+          <p:cNvPr id="2" name="Title 1">
+            <a:extLst>
+              <a:ext uri="{FF2B5EF4-FFF2-40B4-BE49-F238E27FC236}">
+                <a16:creationId xmlns:a16="http://schemas.microsoft.com/office/drawing/2014/main" id="{8B1A818F-8445-4223-9968-115F5EF84FAC}"/>
+              </a:ext>
+            </a:extLst>
+          </p:cNvPr>
+          <p:cNvSpPr>
+            <a:spLocks noGrp="1"/>
+          </p:cNvSpPr>
+          <p:nvPr>
+            <p:ph type="title"/>
+          </p:nvPr>
+        </p:nvSpPr>
+        <p:spPr/>
+        <p:txBody>
+          <a:bodyPr/>
+          <a:lstStyle/>
+          <a:p>
+            <a:endParaRPr lang="en-US"/>
+          </a:p>
+        </p:txBody>
+      </p:sp>
+      <p:sp>
+        <p:nvSpPr>
+          <p:cNvPr id="3" name="Content Placeholder 2">
+            <a:extLst>
+              <a:ext uri="{FF2B5EF4-FFF2-40B4-BE49-F238E27FC236}">
+                <a16:creationId xmlns:a16="http://schemas.microsoft.com/office/drawing/2014/main" id="{E5BE192C-E792-44B6-94D2-A018FF5D6073}"/>
+              </a:ext>
+            </a:extLst>
+          </p:cNvPr>
+          <p:cNvSpPr>
+            <a:spLocks noGrp="1"/>
+          </p:cNvSpPr>
+          <p:nvPr>
+            <p:ph sz="half" idx="1"/>
+          </p:nvPr>
+        </p:nvSpPr>
+        <p:spPr/>
+        <p:txBody>
+          <a:bodyPr/>
+          <a:lstStyle/>
+          <a:p>
+            <a:pPr marL="0" indent="0">
+              <a:buNone/>
+            </a:pPr>
+            <a:r>
+              <a:rPr lang="en-US" sz="2000" b="1" dirty="0">
+                <a:latin typeface="Consolas" panose="020B0609020204030204" pitchFamily="49" charset="0"/>
+                <a:cs typeface="Consolas" panose="020B0609020204030204" pitchFamily="49" charset="0"/>
+              </a:rPr>
+              <a:t>(define x '((1 2) 3 (4))</a:t>
+            </a:r>
+          </a:p>
+          <a:p>
+            <a:pPr marL="0" indent="0">
+              <a:buNone/>
+            </a:pPr>
+            <a:r>
+              <a:rPr lang="en-US" sz="2000" b="1" dirty="0">
+                <a:latin typeface="Consolas" panose="020B0609020204030204" pitchFamily="49" charset="0"/>
+                <a:cs typeface="Consolas" panose="020B0609020204030204" pitchFamily="49" charset="0"/>
+              </a:rPr>
+              <a:t>(define y (cons (car x) (</a:t>
+            </a:r>
+            <a:r>
+              <a:rPr lang="en-US" sz="2000" b="1" dirty="0" err="1">
+                <a:latin typeface="Consolas" panose="020B0609020204030204" pitchFamily="49" charset="0"/>
+                <a:cs typeface="Consolas" panose="020B0609020204030204" pitchFamily="49" charset="0"/>
+              </a:rPr>
+              <a:t>cdr</a:t>
+            </a:r>
+            <a:r>
+              <a:rPr lang="en-US" sz="2000" b="1" dirty="0">
+                <a:latin typeface="Consolas" panose="020B0609020204030204" pitchFamily="49" charset="0"/>
+                <a:cs typeface="Consolas" panose="020B0609020204030204" pitchFamily="49" charset="0"/>
+              </a:rPr>
+              <a:t> x)))</a:t>
+            </a:r>
+          </a:p>
+          <a:p>
+            <a:pPr marL="0" indent="0">
+              <a:buNone/>
+            </a:pPr>
+            <a:r>
+              <a:rPr lang="en-US" sz="2000" b="1" dirty="0">
+                <a:latin typeface="Consolas" panose="020B0609020204030204" pitchFamily="49" charset="0"/>
+                <a:cs typeface="Consolas" panose="020B0609020204030204" pitchFamily="49" charset="0"/>
+              </a:rPr>
+              <a:t>(define z (list (</a:t>
+            </a:r>
+            <a:r>
+              <a:rPr lang="en-US" sz="2000" b="1" dirty="0" err="1">
+                <a:latin typeface="Consolas" panose="020B0609020204030204" pitchFamily="49" charset="0"/>
+                <a:cs typeface="Consolas" panose="020B0609020204030204" pitchFamily="49" charset="0"/>
+              </a:rPr>
+              <a:t>cdr</a:t>
+            </a:r>
+            <a:r>
+              <a:rPr lang="en-US" sz="2000" b="1" dirty="0">
+                <a:latin typeface="Consolas" panose="020B0609020204030204" pitchFamily="49" charset="0"/>
+                <a:cs typeface="Consolas" panose="020B0609020204030204" pitchFamily="49" charset="0"/>
+              </a:rPr>
+              <a:t> x) x))</a:t>
+            </a:r>
+          </a:p>
+          <a:p>
+            <a:pPr marL="0" indent="0">
+              <a:buNone/>
+            </a:pPr>
+            <a:r>
+              <a:rPr lang="en-US" sz="2000" b="1" dirty="0">
+                <a:latin typeface="Consolas" panose="020B0609020204030204" pitchFamily="49" charset="0"/>
+                <a:cs typeface="Consolas" panose="020B0609020204030204" pitchFamily="49" charset="0"/>
+              </a:rPr>
+              <a:t>(define t (append y x))</a:t>
+            </a:r>
+          </a:p>
+          <a:p>
+            <a:pPr marL="0" indent="0">
+              <a:buNone/>
+            </a:pPr>
+            <a:r>
+              <a:rPr lang="en-US" sz="2000" b="1" dirty="0">
+                <a:latin typeface="Consolas" panose="020B0609020204030204" pitchFamily="49" charset="0"/>
+                <a:cs typeface="Consolas" panose="020B0609020204030204" pitchFamily="49" charset="0"/>
+              </a:rPr>
+              <a:t>(write x) (newline)</a:t>
+            </a:r>
+          </a:p>
+          <a:p>
+            <a:pPr marL="0" indent="0">
+              <a:buNone/>
+            </a:pPr>
+            <a:r>
+              <a:rPr lang="en-US" sz="2000" b="1" dirty="0">
+                <a:latin typeface="Consolas" panose="020B0609020204030204" pitchFamily="49" charset="0"/>
+                <a:cs typeface="Consolas" panose="020B0609020204030204" pitchFamily="49" charset="0"/>
+              </a:rPr>
+              <a:t>(write y) (newline)</a:t>
+            </a:r>
+          </a:p>
+          <a:p>
+            <a:pPr marL="0" indent="0">
+              <a:buNone/>
+            </a:pPr>
+            <a:r>
+              <a:rPr lang="en-US" sz="2000" b="1" dirty="0">
+                <a:latin typeface="Consolas" panose="020B0609020204030204" pitchFamily="49" charset="0"/>
+                <a:cs typeface="Consolas" panose="020B0609020204030204" pitchFamily="49" charset="0"/>
+              </a:rPr>
+              <a:t>(write z) (newline)</a:t>
+            </a:r>
+            <a:br>
+              <a:rPr lang="en-US" sz="2000" b="1" dirty="0">
+                <a:latin typeface="Consolas" panose="020B0609020204030204" pitchFamily="49" charset="0"/>
+                <a:cs typeface="Consolas" panose="020B0609020204030204" pitchFamily="49" charset="0"/>
+              </a:rPr>
+            </a:br>
+            <a:r>
+              <a:rPr lang="en-US" sz="2000" b="1" dirty="0">
+                <a:latin typeface="Consolas" panose="020B0609020204030204" pitchFamily="49" charset="0"/>
+                <a:cs typeface="Consolas" panose="020B0609020204030204" pitchFamily="49" charset="0"/>
+              </a:rPr>
+              <a:t>(write t) (newline)</a:t>
+            </a:r>
+            <a:br>
+              <a:rPr lang="en-US" sz="2800" b="1" dirty="0">
+                <a:latin typeface="Consolas" panose="020B0609020204030204" pitchFamily="49" charset="0"/>
+                <a:cs typeface="Consolas" panose="020B0609020204030204" pitchFamily="49" charset="0"/>
+              </a:rPr>
+            </a:br>
+            <a:endParaRPr lang="en-US" dirty="0"/>
+          </a:p>
+        </p:txBody>
+      </p:sp>
+      <p:pic>
+        <p:nvPicPr>
+          <p:cNvPr id="6" name="Content Placeholder 5">
+            <a:extLst>
+              <a:ext uri="{FF2B5EF4-FFF2-40B4-BE49-F238E27FC236}">
+                <a16:creationId xmlns:a16="http://schemas.microsoft.com/office/drawing/2014/main" id="{0AB2E648-72C3-42F2-BEA3-F49A440A35D6}"/>
+              </a:ext>
+            </a:extLst>
+          </p:cNvPr>
+          <p:cNvPicPr>
+            <a:picLocks noGrp="1" noChangeAspect="1"/>
+          </p:cNvPicPr>
+          <p:nvPr>
+            <p:ph sz="half" idx="2"/>
+          </p:nvPr>
+        </p:nvPicPr>
+        <p:blipFill>
+          <a:blip r:embed="rId3"/>
+          <a:stretch>
+            <a:fillRect/>
+          </a:stretch>
+        </p:blipFill>
+        <p:spPr>
+          <a:xfrm>
+            <a:off x="4663907" y="1676400"/>
+            <a:ext cx="4038600" cy="3088795"/>
+          </a:xfrm>
+        </p:spPr>
+      </p:pic>
+      <p:sp>
+        <p:nvSpPr>
+          <p:cNvPr id="7" name="Content Placeholder 2">
+            <a:extLst>
+              <a:ext uri="{FF2B5EF4-FFF2-40B4-BE49-F238E27FC236}">
+                <a16:creationId xmlns:a16="http://schemas.microsoft.com/office/drawing/2014/main" id="{82A5D9F0-2710-4D5D-876C-734D2F83689D}"/>
+              </a:ext>
+            </a:extLst>
+          </p:cNvPr>
+          <p:cNvSpPr txBox="1">
+            <a:spLocks/>
+          </p:cNvSpPr>
+          <p:nvPr/>
+        </p:nvSpPr>
+        <p:spPr bwMode="auto">
+          <a:xfrm>
+            <a:off x="4419600" y="4876800"/>
+            <a:ext cx="4303266" cy="1787525"/>
+          </a:xfrm>
+          <a:prstGeom prst="rect">
+            <a:avLst/>
+          </a:prstGeom>
+          <a:noFill/>
+          <a:ln w="9525">
+            <a:noFill/>
+            <a:miter lim="800000"/>
+            <a:headEnd/>
+            <a:tailEnd/>
+          </a:ln>
+          <a:effectLst/>
+        </p:spPr>
+        <p:txBody>
+          <a:bodyPr vert="horz" wrap="square" lIns="91440" tIns="45720" rIns="91440" bIns="45720" numCol="1" anchor="t" anchorCtr="0" compatLnSpc="1">
+            <a:prstTxWarp prst="textNoShape">
+              <a:avLst/>
+            </a:prstTxWarp>
+          </a:bodyPr>
+          <a:lstStyle>
+            <a:lvl1pPr marL="342900" indent="-342900" algn="l" rtl="0" fontAlgn="base">
+              <a:spcBef>
+                <a:spcPct val="20000"/>
+              </a:spcBef>
+              <a:spcAft>
+                <a:spcPct val="0"/>
+              </a:spcAft>
+              <a:buClr>
+                <a:schemeClr val="hlink"/>
+              </a:buClr>
+              <a:buSzPct val="75000"/>
+              <a:buFont typeface="Wingdings" pitchFamily="2" charset="2"/>
+              <a:buChar char="l"/>
+              <a:defRPr sz="2800">
+                <a:solidFill>
+                  <a:schemeClr val="tx1"/>
+                </a:solidFill>
+                <a:effectLst>
+                  <a:outerShdw blurRad="38100" dist="38100" dir="2700000" algn="tl">
+                    <a:srgbClr val="010199"/>
+                  </a:outerShdw>
+                </a:effectLst>
+                <a:latin typeface="+mn-lt"/>
+                <a:ea typeface="+mn-ea"/>
+                <a:cs typeface="+mn-cs"/>
+              </a:defRPr>
+            </a:lvl1pPr>
+            <a:lvl2pPr marL="742950" indent="-285750" algn="l" rtl="0" fontAlgn="base">
+              <a:spcBef>
+                <a:spcPct val="20000"/>
+              </a:spcBef>
+              <a:spcAft>
+                <a:spcPct val="0"/>
+              </a:spcAft>
+              <a:buClr>
+                <a:schemeClr val="tx2"/>
+              </a:buClr>
+              <a:buSzPct val="75000"/>
+              <a:buFont typeface="Wingdings" pitchFamily="2" charset="2"/>
+              <a:buChar char="l"/>
+              <a:defRPr sz="2400">
+                <a:solidFill>
+                  <a:schemeClr val="tx1"/>
+                </a:solidFill>
+                <a:effectLst>
+                  <a:outerShdw blurRad="38100" dist="38100" dir="2700000" algn="tl">
+                    <a:srgbClr val="010199"/>
+                  </a:outerShdw>
+                </a:effectLst>
+                <a:latin typeface="+mn-lt"/>
+              </a:defRPr>
+            </a:lvl2pPr>
+            <a:lvl3pPr marL="1143000" indent="-228600" algn="l" rtl="0" fontAlgn="base">
+              <a:spcBef>
+                <a:spcPct val="20000"/>
+              </a:spcBef>
+              <a:spcAft>
+                <a:spcPct val="0"/>
+              </a:spcAft>
+              <a:buClr>
+                <a:schemeClr val="accent2"/>
+              </a:buClr>
+              <a:buSzPct val="75000"/>
+              <a:buFont typeface="Wingdings" pitchFamily="2" charset="2"/>
+              <a:buChar char="l"/>
+              <a:defRPr sz="2000">
+                <a:solidFill>
+                  <a:schemeClr val="tx1"/>
+                </a:solidFill>
+                <a:effectLst>
+                  <a:outerShdw blurRad="38100" dist="38100" dir="2700000" algn="tl">
+                    <a:srgbClr val="010199"/>
+                  </a:outerShdw>
+                </a:effectLst>
+                <a:latin typeface="+mn-lt"/>
+              </a:defRPr>
+            </a:lvl3pPr>
+            <a:lvl4pPr marL="1600200" indent="-228600" algn="l" rtl="0" fontAlgn="base">
+              <a:spcBef>
+                <a:spcPct val="20000"/>
+              </a:spcBef>
+              <a:spcAft>
+                <a:spcPct val="0"/>
+              </a:spcAft>
+              <a:buClr>
+                <a:schemeClr val="folHlink"/>
+              </a:buClr>
+              <a:buSzPct val="75000"/>
+              <a:buFont typeface="Wingdings" pitchFamily="2" charset="2"/>
+              <a:buChar char="l"/>
+              <a:defRPr sz="1800">
+                <a:solidFill>
+                  <a:schemeClr val="tx1"/>
+                </a:solidFill>
+                <a:effectLst>
+                  <a:outerShdw blurRad="38100" dist="38100" dir="2700000" algn="tl">
+                    <a:srgbClr val="010199"/>
+                  </a:outerShdw>
+                </a:effectLst>
+                <a:latin typeface="+mn-lt"/>
+              </a:defRPr>
+            </a:lvl4pPr>
+            <a:lvl5pPr marL="2057400" indent="-228600" algn="l" rtl="0" fontAlgn="base">
+              <a:spcBef>
+                <a:spcPct val="20000"/>
+              </a:spcBef>
+              <a:spcAft>
+                <a:spcPct val="0"/>
+              </a:spcAft>
+              <a:buClr>
+                <a:schemeClr val="tx1"/>
+              </a:buClr>
+              <a:buSzPct val="75000"/>
+              <a:buFont typeface="Wingdings" pitchFamily="2" charset="2"/>
+              <a:buChar char="l"/>
+              <a:defRPr sz="1800">
+                <a:solidFill>
+                  <a:schemeClr val="tx1"/>
+                </a:solidFill>
+                <a:effectLst>
+                  <a:outerShdw blurRad="38100" dist="38100" dir="2700000" algn="tl">
+                    <a:srgbClr val="010199"/>
+                  </a:outerShdw>
+                </a:effectLst>
+                <a:latin typeface="+mn-lt"/>
+              </a:defRPr>
+            </a:lvl5pPr>
+            <a:lvl6pPr marL="2514600" indent="-228600" algn="l" rtl="0" fontAlgn="base">
+              <a:spcBef>
+                <a:spcPct val="20000"/>
+              </a:spcBef>
+              <a:spcAft>
+                <a:spcPct val="0"/>
+              </a:spcAft>
+              <a:buClr>
+                <a:schemeClr val="tx1"/>
+              </a:buClr>
+              <a:buSzPct val="75000"/>
+              <a:buFont typeface="Wingdings" pitchFamily="2" charset="2"/>
+              <a:buChar char="l"/>
+              <a:defRPr sz="1800">
+                <a:solidFill>
+                  <a:schemeClr val="tx1"/>
+                </a:solidFill>
+                <a:effectLst>
+                  <a:outerShdw blurRad="38100" dist="38100" dir="2700000" algn="tl">
+                    <a:srgbClr val="010199"/>
+                  </a:outerShdw>
+                </a:effectLst>
+                <a:latin typeface="+mn-lt"/>
+              </a:defRPr>
+            </a:lvl6pPr>
+            <a:lvl7pPr marL="2971800" indent="-228600" algn="l" rtl="0" fontAlgn="base">
+              <a:spcBef>
+                <a:spcPct val="20000"/>
+              </a:spcBef>
+              <a:spcAft>
+                <a:spcPct val="0"/>
+              </a:spcAft>
+              <a:buClr>
+                <a:schemeClr val="tx1"/>
+              </a:buClr>
+              <a:buSzPct val="75000"/>
+              <a:buFont typeface="Wingdings" pitchFamily="2" charset="2"/>
+              <a:buChar char="l"/>
+              <a:defRPr sz="1800">
+                <a:solidFill>
+                  <a:schemeClr val="tx1"/>
+                </a:solidFill>
+                <a:effectLst>
+                  <a:outerShdw blurRad="38100" dist="38100" dir="2700000" algn="tl">
+                    <a:srgbClr val="010199"/>
+                  </a:outerShdw>
+                </a:effectLst>
+                <a:latin typeface="+mn-lt"/>
+              </a:defRPr>
+            </a:lvl7pPr>
+            <a:lvl8pPr marL="3429000" indent="-228600" algn="l" rtl="0" fontAlgn="base">
+              <a:spcBef>
+                <a:spcPct val="20000"/>
+              </a:spcBef>
+              <a:spcAft>
+                <a:spcPct val="0"/>
+              </a:spcAft>
+              <a:buClr>
+                <a:schemeClr val="tx1"/>
+              </a:buClr>
+              <a:buSzPct val="75000"/>
+              <a:buFont typeface="Wingdings" pitchFamily="2" charset="2"/>
+              <a:buChar char="l"/>
+              <a:defRPr sz="1800">
+                <a:solidFill>
+                  <a:schemeClr val="tx1"/>
+                </a:solidFill>
+                <a:effectLst>
+                  <a:outerShdw blurRad="38100" dist="38100" dir="2700000" algn="tl">
+                    <a:srgbClr val="010199"/>
+                  </a:outerShdw>
+                </a:effectLst>
+                <a:latin typeface="+mn-lt"/>
+              </a:defRPr>
+            </a:lvl8pPr>
+            <a:lvl9pPr marL="3886200" indent="-228600" algn="l" rtl="0" fontAlgn="base">
+              <a:spcBef>
+                <a:spcPct val="20000"/>
+              </a:spcBef>
+              <a:spcAft>
+                <a:spcPct val="0"/>
+              </a:spcAft>
+              <a:buClr>
+                <a:schemeClr val="tx1"/>
+              </a:buClr>
+              <a:buSzPct val="75000"/>
+              <a:buFont typeface="Wingdings" pitchFamily="2" charset="2"/>
+              <a:buChar char="l"/>
+              <a:defRPr sz="1800">
+                <a:solidFill>
+                  <a:schemeClr val="tx1"/>
+                </a:solidFill>
+                <a:effectLst>
+                  <a:outerShdw blurRad="38100" dist="38100" dir="2700000" algn="tl">
+                    <a:srgbClr val="010199"/>
+                  </a:outerShdw>
+                </a:effectLst>
+                <a:latin typeface="+mn-lt"/>
+              </a:defRPr>
+            </a:lvl9pPr>
+          </a:lstStyle>
+          <a:p>
+            <a:pPr marL="0" indent="0" eaLnBrk="1" hangingPunct="1">
+              <a:buFont typeface="Wingdings" pitchFamily="2" charset="2"/>
+              <a:buNone/>
+            </a:pPr>
+            <a:r>
+              <a:rPr lang="en-US" sz="2000" kern="0" dirty="0">
+                <a:latin typeface="Consolas" panose="020B0609020204030204" pitchFamily="49" charset="0"/>
+              </a:rPr>
+              <a:t>((1 2) 3 (4))</a:t>
+            </a:r>
+          </a:p>
+          <a:p>
+            <a:pPr marL="0" indent="0" eaLnBrk="1" hangingPunct="1">
+              <a:buFont typeface="Wingdings" pitchFamily="2" charset="2"/>
+              <a:buNone/>
+            </a:pPr>
+            <a:r>
+              <a:rPr lang="en-US" sz="2000" kern="0" dirty="0">
+                <a:latin typeface="Consolas" panose="020B0609020204030204" pitchFamily="49" charset="0"/>
+              </a:rPr>
+              <a:t>((1 2) 3 (4))</a:t>
+            </a:r>
+          </a:p>
+          <a:p>
+            <a:pPr marL="0" indent="0" eaLnBrk="1" hangingPunct="1">
+              <a:buNone/>
+            </a:pPr>
+            <a:r>
+              <a:rPr lang="en-US" sz="2000" kern="0" dirty="0">
+                <a:latin typeface="Consolas" panose="020B0609020204030204" pitchFamily="49" charset="0"/>
+              </a:rPr>
+              <a:t>((3 (4)) ((1 2) 3 (4)))</a:t>
+            </a:r>
+          </a:p>
+          <a:p>
+            <a:pPr marL="0" indent="0" eaLnBrk="1" hangingPunct="1">
+              <a:buFont typeface="Wingdings" pitchFamily="2" charset="2"/>
+              <a:buNone/>
+            </a:pPr>
+            <a:r>
+              <a:rPr lang="en-US" sz="2000" kern="0" dirty="0">
+                <a:latin typeface="Consolas" panose="020B0609020204030204" pitchFamily="49" charset="0"/>
+              </a:rPr>
+              <a:t>((1 2) 3 (4) (1 2) 3 (4))</a:t>
+            </a:r>
+          </a:p>
+        </p:txBody>
+      </p:sp>
+    </p:spTree>
+    <p:extLst>
+      <p:ext uri="{BB962C8B-B14F-4D97-AF65-F5344CB8AC3E}">
+        <p14:creationId xmlns:p14="http://schemas.microsoft.com/office/powerpoint/2010/main" val="3911872155"/>
+      </p:ext>
+    </p:extLst>
+  </p:cSld>
+  <p:clrMapOvr>
+    <a:masterClrMapping/>
+  </p:clrMapOvr>
+</p:sld>
+</file>
+
+<file path=ppt/slides/slide8.xml><?xml version="1.0" encoding="utf-8"?>
+<p:sld xmlns:a="http://schemas.openxmlformats.org/drawingml/2006/main" xmlns:r="http://schemas.openxmlformats.org/officeDocument/2006/relationships" xmlns:p="http://schemas.openxmlformats.org/presentationml/2006/main">
+  <p:cSld>
+    <p:spTree>
+      <p:nvGrpSpPr>
+        <p:cNvPr id="1" name=""/>
+        <p:cNvGrpSpPr/>
+        <p:nvPr/>
+      </p:nvGrpSpPr>
+      <p:grpSpPr>
+        <a:xfrm>
+          <a:off x="0" y="0"/>
+          <a:ext cx="0" cy="0"/>
+          <a:chOff x="0" y="0"/>
+          <a:chExt cx="0" cy="0"/>
+        </a:xfrm>
+      </p:grpSpPr>
+      <p:sp>
+        <p:nvSpPr>
+          <p:cNvPr id="2" name="Title 1">
+            <a:extLst>
+              <a:ext uri="{FF2B5EF4-FFF2-40B4-BE49-F238E27FC236}">
+                <a16:creationId xmlns:a16="http://schemas.microsoft.com/office/drawing/2014/main" id="{9A7806CD-022D-46FC-9142-5A6C62992B8D}"/>
+              </a:ext>
+            </a:extLst>
+          </p:cNvPr>
+          <p:cNvSpPr>
+            <a:spLocks noGrp="1"/>
+          </p:cNvSpPr>
+          <p:nvPr>
+            <p:ph type="title"/>
+          </p:nvPr>
+        </p:nvSpPr>
+        <p:spPr/>
+        <p:txBody>
+          <a:bodyPr/>
+          <a:lstStyle/>
+          <a:p>
+            <a:endParaRPr lang="en-US"/>
+          </a:p>
+        </p:txBody>
+      </p:sp>
+      <p:sp>
+        <p:nvSpPr>
+          <p:cNvPr id="3" name="Content Placeholder 2">
+            <a:extLst>
+              <a:ext uri="{FF2B5EF4-FFF2-40B4-BE49-F238E27FC236}">
+                <a16:creationId xmlns:a16="http://schemas.microsoft.com/office/drawing/2014/main" id="{76C38D3E-A98A-48FF-AC9F-3512860CC05A}"/>
+              </a:ext>
+            </a:extLst>
+          </p:cNvPr>
+          <p:cNvSpPr>
+            <a:spLocks noGrp="1"/>
+          </p:cNvSpPr>
+          <p:nvPr>
+            <p:ph sz="half" idx="1"/>
+          </p:nvPr>
+        </p:nvSpPr>
+        <p:spPr/>
+        <p:txBody>
+          <a:bodyPr/>
+          <a:lstStyle/>
+          <a:p>
+            <a:pPr marL="0" indent="0">
+              <a:buNone/>
+            </a:pPr>
+            <a:r>
+              <a:rPr lang="en-US" sz="2000" b="1" dirty="0">
+                <a:solidFill>
+                  <a:srgbClr val="FF0000"/>
+                </a:solidFill>
+                <a:latin typeface="Consolas" panose="020B0609020204030204" pitchFamily="49" charset="0"/>
+                <a:cs typeface="Consolas" panose="020B0609020204030204" pitchFamily="49" charset="0"/>
+              </a:rPr>
+              <a:t>; What happens if we then…</a:t>
+            </a:r>
+          </a:p>
+          <a:p>
+            <a:pPr marL="0" indent="0">
+              <a:buNone/>
+            </a:pPr>
+            <a:r>
+              <a:rPr lang="en-US" sz="1800" b="1" dirty="0">
+                <a:latin typeface="Consolas" panose="020B0609020204030204" pitchFamily="49" charset="0"/>
+              </a:rPr>
+              <a:t>(set-car! (</a:t>
+            </a:r>
+            <a:r>
+              <a:rPr lang="en-US" sz="1800" b="1" dirty="0" err="1">
+                <a:latin typeface="Consolas" panose="020B0609020204030204" pitchFamily="49" charset="0"/>
+              </a:rPr>
+              <a:t>cdr</a:t>
+            </a:r>
+            <a:r>
+              <a:rPr lang="en-US" sz="1800" b="1" dirty="0">
+                <a:latin typeface="Consolas" panose="020B0609020204030204" pitchFamily="49" charset="0"/>
+              </a:rPr>
+              <a:t> x) 7)</a:t>
+            </a:r>
+          </a:p>
+          <a:p>
+            <a:pPr marL="0" indent="0">
+              <a:buNone/>
+            </a:pPr>
+            <a:r>
+              <a:rPr lang="en-US" sz="1800" b="1" dirty="0">
+                <a:latin typeface="Consolas" panose="020B0609020204030204" pitchFamily="49" charset="0"/>
+                <a:cs typeface="Consolas" panose="020B0609020204030204" pitchFamily="49" charset="0"/>
+              </a:rPr>
+              <a:t>(write t) (newline)</a:t>
+            </a:r>
+          </a:p>
+          <a:p>
+            <a:pPr marL="0" indent="0">
+              <a:buNone/>
+            </a:pPr>
+            <a:r>
+              <a:rPr lang="en-US" sz="1800" b="1" dirty="0">
+                <a:latin typeface="Consolas" panose="020B0609020204030204" pitchFamily="49" charset="0"/>
+                <a:cs typeface="Consolas" panose="020B0609020204030204" pitchFamily="49" charset="0"/>
+              </a:rPr>
+              <a:t>(set-</a:t>
+            </a:r>
+            <a:r>
+              <a:rPr lang="en-US" sz="1800" b="1" dirty="0" err="1">
+                <a:latin typeface="Consolas" panose="020B0609020204030204" pitchFamily="49" charset="0"/>
+                <a:cs typeface="Consolas" panose="020B0609020204030204" pitchFamily="49" charset="0"/>
+              </a:rPr>
+              <a:t>cdr</a:t>
+            </a:r>
+            <a:r>
+              <a:rPr lang="en-US" sz="1800" b="1" dirty="0">
+                <a:latin typeface="Consolas" panose="020B0609020204030204" pitchFamily="49" charset="0"/>
+                <a:cs typeface="Consolas" panose="020B0609020204030204" pitchFamily="49" charset="0"/>
+              </a:rPr>
+              <a:t>! x x) </a:t>
+            </a:r>
+          </a:p>
+          <a:p>
+            <a:pPr marL="0" indent="0">
+              <a:buNone/>
+            </a:pPr>
+            <a:r>
+              <a:rPr lang="en-US" sz="1800" b="1" dirty="0">
+                <a:latin typeface="Consolas" panose="020B0609020204030204" pitchFamily="49" charset="0"/>
+                <a:cs typeface="Consolas" panose="020B0609020204030204" pitchFamily="49" charset="0"/>
+              </a:rPr>
+              <a:t>(write x) (newline)</a:t>
+            </a:r>
+          </a:p>
+          <a:p>
+            <a:pPr marL="0" indent="0">
+              <a:buNone/>
+            </a:pPr>
+            <a:endParaRPr lang="en-US" sz="1800" dirty="0"/>
+          </a:p>
+        </p:txBody>
+      </p:sp>
+      <p:sp>
+        <p:nvSpPr>
+          <p:cNvPr id="4" name="Content Placeholder 3">
+            <a:extLst>
+              <a:ext uri="{FF2B5EF4-FFF2-40B4-BE49-F238E27FC236}">
+                <a16:creationId xmlns:a16="http://schemas.microsoft.com/office/drawing/2014/main" id="{59F696AA-DB46-4FAD-B7BA-17F2CB557544}"/>
+              </a:ext>
+            </a:extLst>
+          </p:cNvPr>
+          <p:cNvSpPr>
+            <a:spLocks noGrp="1"/>
+          </p:cNvSpPr>
+          <p:nvPr>
+            <p:ph sz="half" idx="2"/>
+          </p:nvPr>
+        </p:nvSpPr>
+        <p:spPr/>
+        <p:txBody>
+          <a:bodyPr/>
+          <a:lstStyle/>
+          <a:p>
+            <a:pPr marL="0" indent="0">
+              <a:buNone/>
+            </a:pPr>
+            <a:r>
+              <a:rPr lang="en-US" sz="1600" dirty="0">
+                <a:latin typeface="Consolas" panose="020B0609020204030204" pitchFamily="49" charset="0"/>
+              </a:rPr>
+              <a:t>((1 2) 3 (4) (1 2) 7 (4))</a:t>
+            </a:r>
+          </a:p>
+          <a:p>
+            <a:pPr marL="0" indent="0">
+              <a:buNone/>
+            </a:pPr>
+            <a:r>
+              <a:rPr lang="en-US" sz="1600" dirty="0">
+                <a:latin typeface="Consolas" panose="020B0609020204030204" pitchFamily="49" charset="0"/>
+              </a:rPr>
+              <a:t>Warning in write: cycle detected; proceeding with (print-graph #t)</a:t>
+            </a:r>
+          </a:p>
+          <a:p>
+            <a:pPr marL="0" indent="0">
+              <a:buNone/>
+            </a:pPr>
+            <a:r>
+              <a:rPr lang="en-US" sz="1600" dirty="0">
+                <a:latin typeface="Consolas" panose="020B0609020204030204" pitchFamily="49" charset="0"/>
+              </a:rPr>
+              <a:t>#0=((1 2) . #0#)</a:t>
+            </a:r>
+          </a:p>
+        </p:txBody>
+      </p:sp>
+    </p:spTree>
+    <p:extLst>
+      <p:ext uri="{BB962C8B-B14F-4D97-AF65-F5344CB8AC3E}">
+        <p14:creationId xmlns:p14="http://schemas.microsoft.com/office/powerpoint/2010/main" val="1460356269"/>
+      </p:ext>
+    </p:extLst>
+  </p:cSld>
+  <p:clrMapOvr>
+    <a:masterClrMapping/>
+  </p:clrMapOvr>
+</p:sld>
+</file>
+
+<file path=ppt/slides/slide9.xml><?xml version="1.0" encoding="utf-8"?>
 <p:sld xmlns:a="http://schemas.openxmlformats.org/drawingml/2006/main" xmlns:r="http://schemas.openxmlformats.org/officeDocument/2006/relationships" xmlns:p="http://schemas.openxmlformats.org/presentationml/2006/main">
   <p:cSld>
     <p:spTree>

</xml_diff>